<commit_message>
Description of GPU implementation using CUDA in the platoon system
</commit_message>
<xml_diff>
--- a/Concurrent & Parallel Behavior.pptx
+++ b/Concurrent & Parallel Behavior.pptx
@@ -7,6 +7,7 @@
   <p:sldIdLst>
     <p:sldId id="257" r:id="rId2"/>
     <p:sldId id="258" r:id="rId3"/>
+    <p:sldId id="259" r:id="rId4"/>
   </p:sldIdLst>
   <p:sldSz cx="12192000" cy="6858000"/>
   <p:notesSz cx="6858000" cy="9144000"/>
@@ -260,7 +261,7 @@
           <a:p>
             <a:fld id="{6CE6756D-E188-43E4-BCE6-B5CB8CAD8F21}" type="datetimeFigureOut">
               <a:rPr lang="de-DE" smtClean="0"/>
-              <a:t>07.12.2021</a:t>
+              <a:t>08.12.2021</a:t>
             </a:fld>
             <a:endParaRPr lang="de-DE"/>
           </a:p>
@@ -458,7 +459,7 @@
           <a:p>
             <a:fld id="{6CE6756D-E188-43E4-BCE6-B5CB8CAD8F21}" type="datetimeFigureOut">
               <a:rPr lang="de-DE" smtClean="0"/>
-              <a:t>07.12.2021</a:t>
+              <a:t>08.12.2021</a:t>
             </a:fld>
             <a:endParaRPr lang="de-DE"/>
           </a:p>
@@ -666,7 +667,7 @@
           <a:p>
             <a:fld id="{6CE6756D-E188-43E4-BCE6-B5CB8CAD8F21}" type="datetimeFigureOut">
               <a:rPr lang="de-DE" smtClean="0"/>
-              <a:t>07.12.2021</a:t>
+              <a:t>08.12.2021</a:t>
             </a:fld>
             <a:endParaRPr lang="de-DE"/>
           </a:p>
@@ -864,7 +865,7 @@
           <a:p>
             <a:fld id="{6CE6756D-E188-43E4-BCE6-B5CB8CAD8F21}" type="datetimeFigureOut">
               <a:rPr lang="de-DE" smtClean="0"/>
-              <a:t>07.12.2021</a:t>
+              <a:t>08.12.2021</a:t>
             </a:fld>
             <a:endParaRPr lang="de-DE"/>
           </a:p>
@@ -1139,7 +1140,7 @@
           <a:p>
             <a:fld id="{6CE6756D-E188-43E4-BCE6-B5CB8CAD8F21}" type="datetimeFigureOut">
               <a:rPr lang="de-DE" smtClean="0"/>
-              <a:t>07.12.2021</a:t>
+              <a:t>08.12.2021</a:t>
             </a:fld>
             <a:endParaRPr lang="de-DE"/>
           </a:p>
@@ -1404,7 +1405,7 @@
           <a:p>
             <a:fld id="{6CE6756D-E188-43E4-BCE6-B5CB8CAD8F21}" type="datetimeFigureOut">
               <a:rPr lang="de-DE" smtClean="0"/>
-              <a:t>07.12.2021</a:t>
+              <a:t>08.12.2021</a:t>
             </a:fld>
             <a:endParaRPr lang="de-DE"/>
           </a:p>
@@ -1816,7 +1817,7 @@
           <a:p>
             <a:fld id="{6CE6756D-E188-43E4-BCE6-B5CB8CAD8F21}" type="datetimeFigureOut">
               <a:rPr lang="de-DE" smtClean="0"/>
-              <a:t>07.12.2021</a:t>
+              <a:t>08.12.2021</a:t>
             </a:fld>
             <a:endParaRPr lang="de-DE"/>
           </a:p>
@@ -1957,7 +1958,7 @@
           <a:p>
             <a:fld id="{6CE6756D-E188-43E4-BCE6-B5CB8CAD8F21}" type="datetimeFigureOut">
               <a:rPr lang="de-DE" smtClean="0"/>
-              <a:t>07.12.2021</a:t>
+              <a:t>08.12.2021</a:t>
             </a:fld>
             <a:endParaRPr lang="de-DE"/>
           </a:p>
@@ -2070,7 +2071,7 @@
           <a:p>
             <a:fld id="{6CE6756D-E188-43E4-BCE6-B5CB8CAD8F21}" type="datetimeFigureOut">
               <a:rPr lang="de-DE" smtClean="0"/>
-              <a:t>07.12.2021</a:t>
+              <a:t>08.12.2021</a:t>
             </a:fld>
             <a:endParaRPr lang="de-DE"/>
           </a:p>
@@ -2381,7 +2382,7 @@
           <a:p>
             <a:fld id="{6CE6756D-E188-43E4-BCE6-B5CB8CAD8F21}" type="datetimeFigureOut">
               <a:rPr lang="de-DE" smtClean="0"/>
-              <a:t>07.12.2021</a:t>
+              <a:t>08.12.2021</a:t>
             </a:fld>
             <a:endParaRPr lang="de-DE"/>
           </a:p>
@@ -2669,7 +2670,7 @@
           <a:p>
             <a:fld id="{6CE6756D-E188-43E4-BCE6-B5CB8CAD8F21}" type="datetimeFigureOut">
               <a:rPr lang="de-DE" smtClean="0"/>
-              <a:t>07.12.2021</a:t>
+              <a:t>08.12.2021</a:t>
             </a:fld>
             <a:endParaRPr lang="de-DE"/>
           </a:p>
@@ -2910,7 +2911,7 @@
           <a:p>
             <a:fld id="{6CE6756D-E188-43E4-BCE6-B5CB8CAD8F21}" type="datetimeFigureOut">
               <a:rPr lang="de-DE" smtClean="0"/>
-              <a:t>07.12.2021</a:t>
+              <a:t>08.12.2021</a:t>
             </a:fld>
             <a:endParaRPr lang="de-DE"/>
           </a:p>
@@ -10865,6 +10866,3165 @@
 </p:sld>
 </file>
 
+<file path=ppt/slides/slide3.xml><?xml version="1.0" encoding="utf-8"?>
+<p:sld xmlns:a="http://schemas.openxmlformats.org/drawingml/2006/main" xmlns:r="http://schemas.openxmlformats.org/officeDocument/2006/relationships" xmlns:p="http://schemas.openxmlformats.org/presentationml/2006/main">
+  <p:cSld>
+    <p:spTree>
+      <p:nvGrpSpPr>
+        <p:cNvPr id="1" name=""/>
+        <p:cNvGrpSpPr/>
+        <p:nvPr/>
+      </p:nvGrpSpPr>
+      <p:grpSpPr>
+        <a:xfrm>
+          <a:off x="0" y="0"/>
+          <a:ext cx="0" cy="0"/>
+          <a:chOff x="0" y="0"/>
+          <a:chExt cx="0" cy="0"/>
+        </a:xfrm>
+      </p:grpSpPr>
+      <p:sp>
+        <p:nvSpPr>
+          <p:cNvPr id="2" name="Titel 1">
+            <a:extLst>
+              <a:ext uri="{FF2B5EF4-FFF2-40B4-BE49-F238E27FC236}">
+                <a16:creationId xmlns:a16="http://schemas.microsoft.com/office/drawing/2014/main" id="{82AB40E6-AEC1-4644-AAD0-36B82936FBFC}"/>
+              </a:ext>
+            </a:extLst>
+          </p:cNvPr>
+          <p:cNvSpPr>
+            <a:spLocks noGrp="1"/>
+          </p:cNvSpPr>
+          <p:nvPr>
+            <p:ph type="title"/>
+          </p:nvPr>
+        </p:nvSpPr>
+        <p:spPr>
+          <a:xfrm>
+            <a:off x="838200" y="365126"/>
+            <a:ext cx="5749031" cy="513764"/>
+          </a:xfrm>
+        </p:spPr>
+        <p:txBody>
+          <a:bodyPr>
+            <a:normAutofit fontScale="90000"/>
+          </a:bodyPr>
+          <a:lstStyle/>
+          <a:p>
+            <a:r>
+              <a:rPr lang="de-DE" sz="3200" dirty="0"/>
+              <a:t>GPU </a:t>
+            </a:r>
+            <a:r>
+              <a:rPr lang="de-DE" sz="3200" dirty="0" err="1"/>
+              <a:t>implementation</a:t>
+            </a:r>
+            <a:r>
+              <a:rPr lang="de-DE" sz="3200" dirty="0"/>
+              <a:t> </a:t>
+            </a:r>
+            <a:r>
+              <a:rPr lang="de-DE" sz="3200" dirty="0" err="1"/>
+              <a:t>using</a:t>
+            </a:r>
+            <a:r>
+              <a:rPr lang="de-DE" sz="3200" dirty="0"/>
+              <a:t> CUDA</a:t>
+            </a:r>
+          </a:p>
+        </p:txBody>
+      </p:sp>
+      <p:sp>
+        <p:nvSpPr>
+          <p:cNvPr id="5" name="Textfeld 4">
+            <a:extLst>
+              <a:ext uri="{FF2B5EF4-FFF2-40B4-BE49-F238E27FC236}">
+                <a16:creationId xmlns:a16="http://schemas.microsoft.com/office/drawing/2014/main" id="{27BB5D46-ECA9-49C3-9884-7CEFDDEE3C7D}"/>
+              </a:ext>
+            </a:extLst>
+          </p:cNvPr>
+          <p:cNvSpPr txBox="1"/>
+          <p:nvPr/>
+        </p:nvSpPr>
+        <p:spPr>
+          <a:xfrm>
+            <a:off x="4174718" y="2414040"/>
+            <a:ext cx="5368771" cy="3816429"/>
+          </a:xfrm>
+          <a:prstGeom prst="rect">
+            <a:avLst/>
+          </a:prstGeom>
+          <a:noFill/>
+        </p:spPr>
+        <p:txBody>
+          <a:bodyPr wrap="square">
+            <a:spAutoFit/>
+          </a:bodyPr>
+          <a:lstStyle/>
+          <a:p>
+            <a:r>
+              <a:rPr lang="de-DE" sz="1100" dirty="0">
+                <a:solidFill>
+                  <a:srgbClr val="808080"/>
+                </a:solidFill>
+                <a:latin typeface="Consolas" panose="020B0609020204030204" pitchFamily="49" charset="0"/>
+              </a:rPr>
+              <a:t>#define</a:t>
+            </a:r>
+            <a:r>
+              <a:rPr lang="de-DE" sz="1100" dirty="0">
+                <a:solidFill>
+                  <a:srgbClr val="000000"/>
+                </a:solidFill>
+                <a:latin typeface="Consolas" panose="020B0609020204030204" pitchFamily="49" charset="0"/>
+              </a:rPr>
+              <a:t> </a:t>
+            </a:r>
+            <a:r>
+              <a:rPr lang="de-DE" sz="1100" dirty="0">
+                <a:solidFill>
+                  <a:srgbClr val="6F008A"/>
+                </a:solidFill>
+                <a:latin typeface="Consolas" panose="020B0609020204030204" pitchFamily="49" charset="0"/>
+              </a:rPr>
+              <a:t>NUM_SENSORS</a:t>
+            </a:r>
+            <a:r>
+              <a:rPr lang="de-DE" sz="1100" dirty="0">
+                <a:solidFill>
+                  <a:srgbClr val="000000"/>
+                </a:solidFill>
+                <a:latin typeface="Consolas" panose="020B0609020204030204" pitchFamily="49" charset="0"/>
+              </a:rPr>
+              <a:t> 50</a:t>
+            </a:r>
+          </a:p>
+          <a:p>
+            <a:endParaRPr lang="de-DE" sz="1100" dirty="0">
+              <a:solidFill>
+                <a:srgbClr val="000000"/>
+              </a:solidFill>
+              <a:latin typeface="Consolas" panose="020B0609020204030204" pitchFamily="49" charset="0"/>
+            </a:endParaRPr>
+          </a:p>
+          <a:p>
+            <a:endParaRPr lang="de-DE" sz="1100" dirty="0">
+              <a:solidFill>
+                <a:srgbClr val="000000"/>
+              </a:solidFill>
+              <a:latin typeface="Consolas" panose="020B0609020204030204" pitchFamily="49" charset="0"/>
+            </a:endParaRPr>
+          </a:p>
+          <a:p>
+            <a:endParaRPr lang="de-DE" sz="1100" dirty="0">
+              <a:solidFill>
+                <a:srgbClr val="000000"/>
+              </a:solidFill>
+              <a:latin typeface="Consolas" panose="020B0609020204030204" pitchFamily="49" charset="0"/>
+            </a:endParaRPr>
+          </a:p>
+          <a:p>
+            <a:endParaRPr lang="de-DE" sz="1100" dirty="0">
+              <a:solidFill>
+                <a:srgbClr val="000000"/>
+              </a:solidFill>
+              <a:latin typeface="Consolas" panose="020B0609020204030204" pitchFamily="49" charset="0"/>
+            </a:endParaRPr>
+          </a:p>
+          <a:p>
+            <a:endParaRPr lang="de-DE" sz="1100" dirty="0">
+              <a:solidFill>
+                <a:srgbClr val="000000"/>
+              </a:solidFill>
+              <a:latin typeface="Consolas" panose="020B0609020204030204" pitchFamily="49" charset="0"/>
+            </a:endParaRPr>
+          </a:p>
+          <a:p>
+            <a:endParaRPr lang="de-DE" sz="1100" dirty="0">
+              <a:solidFill>
+                <a:srgbClr val="000000"/>
+              </a:solidFill>
+              <a:latin typeface="Consolas" panose="020B0609020204030204" pitchFamily="49" charset="0"/>
+            </a:endParaRPr>
+          </a:p>
+          <a:p>
+            <a:endParaRPr lang="de-DE" sz="1100" dirty="0">
+              <a:solidFill>
+                <a:srgbClr val="000000"/>
+              </a:solidFill>
+              <a:latin typeface="Consolas" panose="020B0609020204030204" pitchFamily="49" charset="0"/>
+            </a:endParaRPr>
+          </a:p>
+          <a:p>
+            <a:r>
+              <a:rPr lang="de-DE" sz="1100" dirty="0" err="1">
+                <a:solidFill>
+                  <a:srgbClr val="0000FF"/>
+                </a:solidFill>
+                <a:latin typeface="Consolas" panose="020B0609020204030204" pitchFamily="49" charset="0"/>
+              </a:rPr>
+              <a:t>int</a:t>
+            </a:r>
+            <a:r>
+              <a:rPr lang="de-DE" sz="1100" dirty="0">
+                <a:solidFill>
+                  <a:srgbClr val="000000"/>
+                </a:solidFill>
+                <a:latin typeface="Consolas" panose="020B0609020204030204" pitchFamily="49" charset="0"/>
+              </a:rPr>
+              <a:t> </a:t>
+            </a:r>
+            <a:r>
+              <a:rPr lang="de-DE" sz="1100" dirty="0" err="1">
+                <a:solidFill>
+                  <a:srgbClr val="000000"/>
+                </a:solidFill>
+                <a:latin typeface="Consolas" panose="020B0609020204030204" pitchFamily="49" charset="0"/>
+              </a:rPr>
+              <a:t>main</a:t>
+            </a:r>
+            <a:r>
+              <a:rPr lang="de-DE" sz="1100" dirty="0">
+                <a:solidFill>
+                  <a:srgbClr val="000000"/>
+                </a:solidFill>
+                <a:latin typeface="Consolas" panose="020B0609020204030204" pitchFamily="49" charset="0"/>
+              </a:rPr>
+              <a:t>()</a:t>
+            </a:r>
+          </a:p>
+          <a:p>
+            <a:r>
+              <a:rPr lang="de-DE" sz="1100" dirty="0">
+                <a:solidFill>
+                  <a:srgbClr val="000000"/>
+                </a:solidFill>
+                <a:latin typeface="Consolas" panose="020B0609020204030204" pitchFamily="49" charset="0"/>
+              </a:rPr>
+              <a:t>{</a:t>
+            </a:r>
+          </a:p>
+          <a:p>
+            <a:r>
+              <a:rPr lang="de-DE" sz="1100" dirty="0">
+                <a:solidFill>
+                  <a:srgbClr val="000000"/>
+                </a:solidFill>
+                <a:latin typeface="Consolas" panose="020B0609020204030204" pitchFamily="49" charset="0"/>
+              </a:rPr>
+              <a:t>    </a:t>
+            </a:r>
+            <a:r>
+              <a:rPr lang="de-DE" sz="1100" dirty="0">
+                <a:solidFill>
+                  <a:srgbClr val="0000FF"/>
+                </a:solidFill>
+                <a:latin typeface="Consolas" panose="020B0609020204030204" pitchFamily="49" charset="0"/>
+              </a:rPr>
+              <a:t>double</a:t>
+            </a:r>
+            <a:r>
+              <a:rPr lang="de-DE" sz="1100" dirty="0">
+                <a:solidFill>
+                  <a:srgbClr val="000000"/>
+                </a:solidFill>
+                <a:latin typeface="Consolas" panose="020B0609020204030204" pitchFamily="49" charset="0"/>
+              </a:rPr>
+              <a:t> </a:t>
+            </a:r>
+            <a:r>
+              <a:rPr lang="de-DE" sz="1100" dirty="0" err="1">
+                <a:solidFill>
+                  <a:srgbClr val="000000"/>
+                </a:solidFill>
+                <a:latin typeface="Consolas" panose="020B0609020204030204" pitchFamily="49" charset="0"/>
+              </a:rPr>
+              <a:t>readings</a:t>
+            </a:r>
+            <a:r>
+              <a:rPr lang="de-DE" sz="1100" dirty="0">
+                <a:solidFill>
+                  <a:srgbClr val="000000"/>
+                </a:solidFill>
+                <a:latin typeface="Consolas" panose="020B0609020204030204" pitchFamily="49" charset="0"/>
+              </a:rPr>
+              <a:t>[</a:t>
+            </a:r>
+            <a:r>
+              <a:rPr lang="de-DE" sz="1100" dirty="0">
+                <a:solidFill>
+                  <a:srgbClr val="6F008A"/>
+                </a:solidFill>
+                <a:latin typeface="Consolas" panose="020B0609020204030204" pitchFamily="49" charset="0"/>
+              </a:rPr>
+              <a:t>NUM_SENSORS</a:t>
+            </a:r>
+            <a:r>
+              <a:rPr lang="de-DE" sz="1100" dirty="0">
+                <a:solidFill>
+                  <a:srgbClr val="000000"/>
+                </a:solidFill>
+                <a:latin typeface="Consolas" panose="020B0609020204030204" pitchFamily="49" charset="0"/>
+              </a:rPr>
+              <a:t>];</a:t>
+            </a:r>
+          </a:p>
+          <a:p>
+            <a:r>
+              <a:rPr lang="de-DE" sz="1100" dirty="0">
+                <a:solidFill>
+                  <a:srgbClr val="000000"/>
+                </a:solidFill>
+                <a:latin typeface="Consolas" panose="020B0609020204030204" pitchFamily="49" charset="0"/>
+              </a:rPr>
+              <a:t>    </a:t>
+            </a:r>
+            <a:r>
+              <a:rPr lang="de-DE" sz="1100" dirty="0">
+                <a:solidFill>
+                  <a:srgbClr val="2B91AF"/>
+                </a:solidFill>
+                <a:latin typeface="Consolas" panose="020B0609020204030204" pitchFamily="49" charset="0"/>
+              </a:rPr>
+              <a:t>Sensor</a:t>
+            </a:r>
+            <a:r>
+              <a:rPr lang="de-DE" sz="1100" dirty="0">
+                <a:solidFill>
+                  <a:srgbClr val="000000"/>
+                </a:solidFill>
+                <a:latin typeface="Consolas" panose="020B0609020204030204" pitchFamily="49" charset="0"/>
+              </a:rPr>
+              <a:t> </a:t>
+            </a:r>
+            <a:r>
+              <a:rPr lang="de-DE" sz="1100" dirty="0" err="1">
+                <a:solidFill>
+                  <a:srgbClr val="000000"/>
+                </a:solidFill>
+                <a:latin typeface="Consolas" panose="020B0609020204030204" pitchFamily="49" charset="0"/>
+              </a:rPr>
+              <a:t>sensors</a:t>
+            </a:r>
+            <a:r>
+              <a:rPr lang="de-DE" sz="1100" dirty="0">
+                <a:solidFill>
+                  <a:srgbClr val="000000"/>
+                </a:solidFill>
+                <a:latin typeface="Consolas" panose="020B0609020204030204" pitchFamily="49" charset="0"/>
+              </a:rPr>
+              <a:t>[</a:t>
+            </a:r>
+            <a:r>
+              <a:rPr lang="de-DE" sz="1100" dirty="0">
+                <a:solidFill>
+                  <a:srgbClr val="6F008A"/>
+                </a:solidFill>
+                <a:latin typeface="Consolas" panose="020B0609020204030204" pitchFamily="49" charset="0"/>
+              </a:rPr>
+              <a:t>NUM_SENSORS</a:t>
+            </a:r>
+            <a:r>
+              <a:rPr lang="de-DE" sz="1100" dirty="0">
+                <a:solidFill>
+                  <a:srgbClr val="000000"/>
+                </a:solidFill>
+                <a:latin typeface="Consolas" panose="020B0609020204030204" pitchFamily="49" charset="0"/>
+              </a:rPr>
+              <a:t>];</a:t>
+            </a:r>
+          </a:p>
+          <a:p>
+            <a:endParaRPr lang="de-DE" sz="1100" dirty="0">
+              <a:solidFill>
+                <a:srgbClr val="000000"/>
+              </a:solidFill>
+              <a:latin typeface="Consolas" panose="020B0609020204030204" pitchFamily="49" charset="0"/>
+            </a:endParaRPr>
+          </a:p>
+          <a:p>
+            <a:r>
+              <a:rPr lang="en-US" sz="1100" dirty="0">
+                <a:solidFill>
+                  <a:srgbClr val="000000"/>
+                </a:solidFill>
+                <a:latin typeface="Consolas" panose="020B0609020204030204" pitchFamily="49" charset="0"/>
+              </a:rPr>
+              <a:t>    </a:t>
+            </a:r>
+          </a:p>
+          <a:p>
+            <a:endParaRPr lang="de-DE" sz="1100" dirty="0">
+              <a:solidFill>
+                <a:srgbClr val="000000"/>
+              </a:solidFill>
+              <a:latin typeface="Consolas" panose="020B0609020204030204" pitchFamily="49" charset="0"/>
+            </a:endParaRPr>
+          </a:p>
+          <a:p>
+            <a:endParaRPr lang="de-DE" sz="1100" dirty="0">
+              <a:solidFill>
+                <a:srgbClr val="000000"/>
+              </a:solidFill>
+              <a:latin typeface="Consolas" panose="020B0609020204030204" pitchFamily="49" charset="0"/>
+            </a:endParaRPr>
+          </a:p>
+          <a:p>
+            <a:endParaRPr lang="de-DE" sz="1100" dirty="0">
+              <a:solidFill>
+                <a:srgbClr val="000000"/>
+              </a:solidFill>
+              <a:latin typeface="Consolas" panose="020B0609020204030204" pitchFamily="49" charset="0"/>
+            </a:endParaRPr>
+          </a:p>
+          <a:p>
+            <a:endParaRPr lang="de-DE" sz="1100" dirty="0">
+              <a:solidFill>
+                <a:srgbClr val="000000"/>
+              </a:solidFill>
+              <a:latin typeface="Consolas" panose="020B0609020204030204" pitchFamily="49" charset="0"/>
+            </a:endParaRPr>
+          </a:p>
+          <a:p>
+            <a:endParaRPr lang="de-DE" sz="1100" dirty="0">
+              <a:solidFill>
+                <a:srgbClr val="000000"/>
+              </a:solidFill>
+              <a:latin typeface="Consolas" panose="020B0609020204030204" pitchFamily="49" charset="0"/>
+            </a:endParaRPr>
+          </a:p>
+          <a:p>
+            <a:endParaRPr lang="de-DE" sz="1100" dirty="0">
+              <a:solidFill>
+                <a:srgbClr val="000000"/>
+              </a:solidFill>
+              <a:latin typeface="Consolas" panose="020B0609020204030204" pitchFamily="49" charset="0"/>
+            </a:endParaRPr>
+          </a:p>
+          <a:p>
+            <a:endParaRPr lang="de-DE" sz="1100" dirty="0">
+              <a:solidFill>
+                <a:srgbClr val="000000"/>
+              </a:solidFill>
+              <a:latin typeface="Consolas" panose="020B0609020204030204" pitchFamily="49" charset="0"/>
+            </a:endParaRPr>
+          </a:p>
+          <a:p>
+            <a:r>
+              <a:rPr lang="de-DE" sz="1100" dirty="0">
+                <a:solidFill>
+                  <a:srgbClr val="000000"/>
+                </a:solidFill>
+                <a:latin typeface="Consolas" panose="020B0609020204030204" pitchFamily="49" charset="0"/>
+              </a:rPr>
+              <a:t>}</a:t>
+            </a:r>
+            <a:endParaRPr lang="de-DE" sz="1100" dirty="0"/>
+          </a:p>
+        </p:txBody>
+      </p:sp>
+      <p:sp>
+        <p:nvSpPr>
+          <p:cNvPr id="6" name="Textfeld 5">
+            <a:extLst>
+              <a:ext uri="{FF2B5EF4-FFF2-40B4-BE49-F238E27FC236}">
+                <a16:creationId xmlns:a16="http://schemas.microsoft.com/office/drawing/2014/main" id="{18428270-932E-4697-AE82-F72FDC6959B2}"/>
+              </a:ext>
+            </a:extLst>
+          </p:cNvPr>
+          <p:cNvSpPr txBox="1"/>
+          <p:nvPr/>
+        </p:nvSpPr>
+        <p:spPr>
+          <a:xfrm>
+            <a:off x="838200" y="1082475"/>
+            <a:ext cx="6334957" cy="307777"/>
+          </a:xfrm>
+          <a:prstGeom prst="rect">
+            <a:avLst/>
+          </a:prstGeom>
+          <a:noFill/>
+        </p:spPr>
+        <p:txBody>
+          <a:bodyPr wrap="square">
+            <a:spAutoFit/>
+          </a:bodyPr>
+          <a:lstStyle/>
+          <a:p>
+            <a:r>
+              <a:rPr lang="en-US" sz="1400" dirty="0">
+                <a:solidFill>
+                  <a:srgbClr val="008000"/>
+                </a:solidFill>
+                <a:latin typeface="Consolas" panose="020B0609020204030204" pitchFamily="49" charset="0"/>
+              </a:rPr>
+              <a:t>Use Case: Reading from 50 sensors on a truck in the platoon</a:t>
+            </a:r>
+            <a:endParaRPr lang="de-DE" sz="1000" dirty="0">
+              <a:solidFill>
+                <a:srgbClr val="000000"/>
+              </a:solidFill>
+              <a:latin typeface="Consolas" panose="020B0609020204030204" pitchFamily="49" charset="0"/>
+            </a:endParaRPr>
+          </a:p>
+        </p:txBody>
+      </p:sp>
+      <p:sp>
+        <p:nvSpPr>
+          <p:cNvPr id="7" name="Ellipse 6">
+            <a:extLst>
+              <a:ext uri="{FF2B5EF4-FFF2-40B4-BE49-F238E27FC236}">
+                <a16:creationId xmlns:a16="http://schemas.microsoft.com/office/drawing/2014/main" id="{9491E445-7A64-4DF7-9F27-15C5B8519C2B}"/>
+              </a:ext>
+            </a:extLst>
+          </p:cNvPr>
+          <p:cNvSpPr/>
+          <p:nvPr/>
+        </p:nvSpPr>
+        <p:spPr>
+          <a:xfrm>
+            <a:off x="7317237" y="912328"/>
+            <a:ext cx="1997476" cy="648069"/>
+          </a:xfrm>
+          <a:prstGeom prst="ellipse">
+            <a:avLst/>
+          </a:prstGeom>
+          <a:solidFill>
+            <a:schemeClr val="accent6">
+              <a:lumMod val="75000"/>
+            </a:schemeClr>
+          </a:solidFill>
+        </p:spPr>
+        <p:style>
+          <a:lnRef idx="2">
+            <a:schemeClr val="accent1">
+              <a:shade val="50000"/>
+            </a:schemeClr>
+          </a:lnRef>
+          <a:fillRef idx="1">
+            <a:schemeClr val="accent1"/>
+          </a:fillRef>
+          <a:effectRef idx="0">
+            <a:schemeClr val="accent1"/>
+          </a:effectRef>
+          <a:fontRef idx="minor">
+            <a:schemeClr val="lt1"/>
+          </a:fontRef>
+        </p:style>
+        <p:txBody>
+          <a:bodyPr rtlCol="0" anchor="ctr"/>
+          <a:lstStyle/>
+          <a:p>
+            <a:pPr algn="ctr"/>
+            <a:r>
+              <a:rPr lang="de-DE" sz="1400" dirty="0"/>
+              <a:t>Single </a:t>
+            </a:r>
+            <a:r>
+              <a:rPr lang="de-DE" sz="1400" dirty="0" err="1"/>
+              <a:t>task</a:t>
+            </a:r>
+            <a:r>
+              <a:rPr lang="de-DE" sz="1400" dirty="0"/>
+              <a:t> </a:t>
+            </a:r>
+          </a:p>
+          <a:p>
+            <a:pPr algn="ctr"/>
+            <a:r>
+              <a:rPr lang="de-DE" sz="1400" dirty="0"/>
+              <a:t>Multiple Data</a:t>
+            </a:r>
+          </a:p>
+        </p:txBody>
+      </p:sp>
+      <p:sp>
+        <p:nvSpPr>
+          <p:cNvPr id="8" name="Textfeld 7">
+            <a:extLst>
+              <a:ext uri="{FF2B5EF4-FFF2-40B4-BE49-F238E27FC236}">
+                <a16:creationId xmlns:a16="http://schemas.microsoft.com/office/drawing/2014/main" id="{5184E652-37C1-4976-9CEA-E4D10801F471}"/>
+              </a:ext>
+            </a:extLst>
+          </p:cNvPr>
+          <p:cNvSpPr txBox="1"/>
+          <p:nvPr/>
+        </p:nvSpPr>
+        <p:spPr>
+          <a:xfrm>
+            <a:off x="438701" y="1896954"/>
+            <a:ext cx="2733890" cy="369332"/>
+          </a:xfrm>
+          <a:prstGeom prst="rect">
+            <a:avLst/>
+          </a:prstGeom>
+          <a:noFill/>
+        </p:spPr>
+        <p:txBody>
+          <a:bodyPr wrap="none" rtlCol="0">
+            <a:spAutoFit/>
+          </a:bodyPr>
+          <a:lstStyle/>
+          <a:p>
+            <a:r>
+              <a:rPr lang="de-DE" dirty="0" err="1">
+                <a:solidFill>
+                  <a:schemeClr val="accent1">
+                    <a:lumMod val="75000"/>
+                  </a:schemeClr>
+                </a:solidFill>
+              </a:rPr>
+              <a:t>Sequential</a:t>
+            </a:r>
+            <a:r>
+              <a:rPr lang="de-DE" dirty="0">
+                <a:solidFill>
+                  <a:schemeClr val="accent1">
+                    <a:lumMod val="75000"/>
+                  </a:schemeClr>
+                </a:solidFill>
+              </a:rPr>
+              <a:t> </a:t>
+            </a:r>
+            <a:r>
+              <a:rPr lang="de-DE" dirty="0" err="1">
+                <a:solidFill>
+                  <a:schemeClr val="accent1">
+                    <a:lumMod val="75000"/>
+                  </a:schemeClr>
+                </a:solidFill>
+              </a:rPr>
+              <a:t>implementation</a:t>
+            </a:r>
+            <a:endParaRPr lang="de-DE" dirty="0">
+              <a:solidFill>
+                <a:schemeClr val="accent1">
+                  <a:lumMod val="75000"/>
+                </a:schemeClr>
+              </a:solidFill>
+            </a:endParaRPr>
+          </a:p>
+        </p:txBody>
+      </p:sp>
+      <p:sp>
+        <p:nvSpPr>
+          <p:cNvPr id="9" name="Textfeld 8">
+            <a:extLst>
+              <a:ext uri="{FF2B5EF4-FFF2-40B4-BE49-F238E27FC236}">
+                <a16:creationId xmlns:a16="http://schemas.microsoft.com/office/drawing/2014/main" id="{F6286907-640D-41EA-9E89-3B348EE6BD73}"/>
+              </a:ext>
+            </a:extLst>
+          </p:cNvPr>
+          <p:cNvSpPr txBox="1"/>
+          <p:nvPr/>
+        </p:nvSpPr>
+        <p:spPr>
+          <a:xfrm>
+            <a:off x="438701" y="2420439"/>
+            <a:ext cx="3606950" cy="2123658"/>
+          </a:xfrm>
+          <a:prstGeom prst="rect">
+            <a:avLst/>
+          </a:prstGeom>
+          <a:noFill/>
+        </p:spPr>
+        <p:txBody>
+          <a:bodyPr wrap="square">
+            <a:spAutoFit/>
+          </a:bodyPr>
+          <a:lstStyle/>
+          <a:p>
+            <a:r>
+              <a:rPr lang="de-DE" sz="1100" dirty="0">
+                <a:solidFill>
+                  <a:srgbClr val="808080"/>
+                </a:solidFill>
+                <a:latin typeface="Consolas" panose="020B0609020204030204" pitchFamily="49" charset="0"/>
+              </a:rPr>
+              <a:t>#define</a:t>
+            </a:r>
+            <a:r>
+              <a:rPr lang="de-DE" sz="1100" dirty="0">
+                <a:solidFill>
+                  <a:srgbClr val="000000"/>
+                </a:solidFill>
+                <a:latin typeface="Consolas" panose="020B0609020204030204" pitchFamily="49" charset="0"/>
+              </a:rPr>
+              <a:t> </a:t>
+            </a:r>
+            <a:r>
+              <a:rPr lang="de-DE" sz="1100" dirty="0">
+                <a:solidFill>
+                  <a:srgbClr val="6F008A"/>
+                </a:solidFill>
+                <a:latin typeface="Consolas" panose="020B0609020204030204" pitchFamily="49" charset="0"/>
+              </a:rPr>
+              <a:t>NUM_SENSORS</a:t>
+            </a:r>
+            <a:r>
+              <a:rPr lang="de-DE" sz="1100" dirty="0">
+                <a:solidFill>
+                  <a:srgbClr val="000000"/>
+                </a:solidFill>
+                <a:latin typeface="Consolas" panose="020B0609020204030204" pitchFamily="49" charset="0"/>
+              </a:rPr>
+              <a:t> 50</a:t>
+            </a:r>
+          </a:p>
+          <a:p>
+            <a:endParaRPr lang="de-DE" sz="1100" dirty="0">
+              <a:solidFill>
+                <a:srgbClr val="000000"/>
+              </a:solidFill>
+              <a:latin typeface="Consolas" panose="020B0609020204030204" pitchFamily="49" charset="0"/>
+            </a:endParaRPr>
+          </a:p>
+          <a:p>
+            <a:r>
+              <a:rPr lang="de-DE" sz="1100" dirty="0" err="1">
+                <a:solidFill>
+                  <a:srgbClr val="0000FF"/>
+                </a:solidFill>
+                <a:latin typeface="Consolas" panose="020B0609020204030204" pitchFamily="49" charset="0"/>
+              </a:rPr>
+              <a:t>int</a:t>
+            </a:r>
+            <a:r>
+              <a:rPr lang="de-DE" sz="1100" dirty="0">
+                <a:solidFill>
+                  <a:srgbClr val="000000"/>
+                </a:solidFill>
+                <a:latin typeface="Consolas" panose="020B0609020204030204" pitchFamily="49" charset="0"/>
+              </a:rPr>
+              <a:t> </a:t>
+            </a:r>
+            <a:r>
+              <a:rPr lang="de-DE" sz="1100" dirty="0" err="1">
+                <a:solidFill>
+                  <a:srgbClr val="000000"/>
+                </a:solidFill>
+                <a:latin typeface="Consolas" panose="020B0609020204030204" pitchFamily="49" charset="0"/>
+              </a:rPr>
+              <a:t>main</a:t>
+            </a:r>
+            <a:r>
+              <a:rPr lang="de-DE" sz="1100" dirty="0">
+                <a:solidFill>
+                  <a:srgbClr val="000000"/>
+                </a:solidFill>
+                <a:latin typeface="Consolas" panose="020B0609020204030204" pitchFamily="49" charset="0"/>
+              </a:rPr>
+              <a:t>()</a:t>
+            </a:r>
+          </a:p>
+          <a:p>
+            <a:r>
+              <a:rPr lang="de-DE" sz="1100" dirty="0">
+                <a:solidFill>
+                  <a:srgbClr val="000000"/>
+                </a:solidFill>
+                <a:latin typeface="Consolas" panose="020B0609020204030204" pitchFamily="49" charset="0"/>
+              </a:rPr>
+              <a:t>{</a:t>
+            </a:r>
+          </a:p>
+          <a:p>
+            <a:r>
+              <a:rPr lang="de-DE" sz="1100" dirty="0">
+                <a:solidFill>
+                  <a:srgbClr val="000000"/>
+                </a:solidFill>
+                <a:latin typeface="Consolas" panose="020B0609020204030204" pitchFamily="49" charset="0"/>
+              </a:rPr>
+              <a:t>    </a:t>
+            </a:r>
+            <a:r>
+              <a:rPr lang="de-DE" sz="1100" dirty="0">
+                <a:solidFill>
+                  <a:srgbClr val="0000FF"/>
+                </a:solidFill>
+                <a:latin typeface="Consolas" panose="020B0609020204030204" pitchFamily="49" charset="0"/>
+              </a:rPr>
+              <a:t>double</a:t>
+            </a:r>
+            <a:r>
+              <a:rPr lang="de-DE" sz="1100" dirty="0">
+                <a:solidFill>
+                  <a:srgbClr val="000000"/>
+                </a:solidFill>
+                <a:latin typeface="Consolas" panose="020B0609020204030204" pitchFamily="49" charset="0"/>
+              </a:rPr>
+              <a:t> </a:t>
+            </a:r>
+            <a:r>
+              <a:rPr lang="de-DE" sz="1100" dirty="0" err="1">
+                <a:solidFill>
+                  <a:srgbClr val="000000"/>
+                </a:solidFill>
+                <a:latin typeface="Consolas" panose="020B0609020204030204" pitchFamily="49" charset="0"/>
+              </a:rPr>
+              <a:t>readings</a:t>
+            </a:r>
+            <a:r>
+              <a:rPr lang="de-DE" sz="1100" dirty="0">
+                <a:solidFill>
+                  <a:srgbClr val="000000"/>
+                </a:solidFill>
+                <a:latin typeface="Consolas" panose="020B0609020204030204" pitchFamily="49" charset="0"/>
+              </a:rPr>
+              <a:t>[</a:t>
+            </a:r>
+            <a:r>
+              <a:rPr lang="de-DE" sz="1100" dirty="0">
+                <a:solidFill>
+                  <a:srgbClr val="6F008A"/>
+                </a:solidFill>
+                <a:latin typeface="Consolas" panose="020B0609020204030204" pitchFamily="49" charset="0"/>
+              </a:rPr>
+              <a:t>NUM_SENSORS</a:t>
+            </a:r>
+            <a:r>
+              <a:rPr lang="de-DE" sz="1100" dirty="0">
+                <a:solidFill>
+                  <a:srgbClr val="000000"/>
+                </a:solidFill>
+                <a:latin typeface="Consolas" panose="020B0609020204030204" pitchFamily="49" charset="0"/>
+              </a:rPr>
+              <a:t>];</a:t>
+            </a:r>
+          </a:p>
+          <a:p>
+            <a:r>
+              <a:rPr lang="de-DE" sz="1100" dirty="0">
+                <a:solidFill>
+                  <a:srgbClr val="000000"/>
+                </a:solidFill>
+                <a:latin typeface="Consolas" panose="020B0609020204030204" pitchFamily="49" charset="0"/>
+              </a:rPr>
+              <a:t>    </a:t>
+            </a:r>
+            <a:r>
+              <a:rPr lang="de-DE" sz="1100" dirty="0">
+                <a:solidFill>
+                  <a:srgbClr val="2B91AF"/>
+                </a:solidFill>
+                <a:latin typeface="Consolas" panose="020B0609020204030204" pitchFamily="49" charset="0"/>
+              </a:rPr>
+              <a:t>Sensor</a:t>
+            </a:r>
+            <a:r>
+              <a:rPr lang="de-DE" sz="1100" dirty="0">
+                <a:solidFill>
+                  <a:srgbClr val="000000"/>
+                </a:solidFill>
+                <a:latin typeface="Consolas" panose="020B0609020204030204" pitchFamily="49" charset="0"/>
+              </a:rPr>
+              <a:t> </a:t>
+            </a:r>
+            <a:r>
+              <a:rPr lang="de-DE" sz="1100" dirty="0" err="1">
+                <a:solidFill>
+                  <a:srgbClr val="000000"/>
+                </a:solidFill>
+                <a:latin typeface="Consolas" panose="020B0609020204030204" pitchFamily="49" charset="0"/>
+              </a:rPr>
+              <a:t>sensors</a:t>
+            </a:r>
+            <a:r>
+              <a:rPr lang="de-DE" sz="1100" dirty="0">
+                <a:solidFill>
+                  <a:srgbClr val="000000"/>
+                </a:solidFill>
+                <a:latin typeface="Consolas" panose="020B0609020204030204" pitchFamily="49" charset="0"/>
+              </a:rPr>
+              <a:t>[</a:t>
+            </a:r>
+            <a:r>
+              <a:rPr lang="de-DE" sz="1100" dirty="0">
+                <a:solidFill>
+                  <a:srgbClr val="6F008A"/>
+                </a:solidFill>
+                <a:latin typeface="Consolas" panose="020B0609020204030204" pitchFamily="49" charset="0"/>
+              </a:rPr>
+              <a:t>NUM_SENSORS</a:t>
+            </a:r>
+            <a:r>
+              <a:rPr lang="de-DE" sz="1100" dirty="0">
+                <a:solidFill>
+                  <a:srgbClr val="000000"/>
+                </a:solidFill>
+                <a:latin typeface="Consolas" panose="020B0609020204030204" pitchFamily="49" charset="0"/>
+              </a:rPr>
+              <a:t>];</a:t>
+            </a:r>
+          </a:p>
+          <a:p>
+            <a:endParaRPr lang="de-DE" sz="1100" dirty="0">
+              <a:solidFill>
+                <a:srgbClr val="000000"/>
+              </a:solidFill>
+              <a:latin typeface="Consolas" panose="020B0609020204030204" pitchFamily="49" charset="0"/>
+            </a:endParaRPr>
+          </a:p>
+          <a:p>
+            <a:r>
+              <a:rPr lang="de-DE" sz="1100" dirty="0">
+                <a:solidFill>
+                  <a:srgbClr val="000000"/>
+                </a:solidFill>
+                <a:latin typeface="Consolas" panose="020B0609020204030204" pitchFamily="49" charset="0"/>
+              </a:rPr>
+              <a:t>    </a:t>
+            </a:r>
+            <a:r>
+              <a:rPr lang="de-DE" sz="1100" dirty="0" err="1">
+                <a:solidFill>
+                  <a:srgbClr val="0000FF"/>
+                </a:solidFill>
+                <a:latin typeface="Consolas" panose="020B0609020204030204" pitchFamily="49" charset="0"/>
+              </a:rPr>
+              <a:t>for</a:t>
+            </a:r>
+            <a:r>
+              <a:rPr lang="de-DE" sz="1100" dirty="0">
+                <a:solidFill>
+                  <a:srgbClr val="000000"/>
+                </a:solidFill>
+                <a:latin typeface="Consolas" panose="020B0609020204030204" pitchFamily="49" charset="0"/>
+              </a:rPr>
+              <a:t> (</a:t>
+            </a:r>
+            <a:r>
+              <a:rPr lang="de-DE" sz="1100" dirty="0" err="1">
+                <a:solidFill>
+                  <a:srgbClr val="0000FF"/>
+                </a:solidFill>
+                <a:latin typeface="Consolas" panose="020B0609020204030204" pitchFamily="49" charset="0"/>
+              </a:rPr>
+              <a:t>int</a:t>
+            </a:r>
+            <a:r>
+              <a:rPr lang="de-DE" sz="1100" dirty="0">
+                <a:solidFill>
+                  <a:srgbClr val="000000"/>
+                </a:solidFill>
+                <a:latin typeface="Consolas" panose="020B0609020204030204" pitchFamily="49" charset="0"/>
+              </a:rPr>
+              <a:t> i = 0; i &lt; </a:t>
+            </a:r>
+            <a:r>
+              <a:rPr lang="de-DE" sz="1100" dirty="0">
+                <a:solidFill>
+                  <a:srgbClr val="6F008A"/>
+                </a:solidFill>
+                <a:latin typeface="Consolas" panose="020B0609020204030204" pitchFamily="49" charset="0"/>
+              </a:rPr>
+              <a:t>NUM_SENSORS</a:t>
+            </a:r>
+            <a:r>
+              <a:rPr lang="de-DE" sz="1100" dirty="0">
+                <a:solidFill>
+                  <a:srgbClr val="000000"/>
+                </a:solidFill>
+                <a:latin typeface="Consolas" panose="020B0609020204030204" pitchFamily="49" charset="0"/>
+              </a:rPr>
+              <a:t>; i++) {</a:t>
+            </a:r>
+          </a:p>
+          <a:p>
+            <a:r>
+              <a:rPr lang="en-US" sz="1100" dirty="0">
+                <a:solidFill>
+                  <a:srgbClr val="000000"/>
+                </a:solidFill>
+                <a:latin typeface="Consolas" panose="020B0609020204030204" pitchFamily="49" charset="0"/>
+              </a:rPr>
+              <a:t>        readings[</a:t>
+            </a:r>
+            <a:r>
+              <a:rPr lang="en-US" sz="1100" dirty="0" err="1">
+                <a:solidFill>
+                  <a:srgbClr val="000000"/>
+                </a:solidFill>
+                <a:latin typeface="Consolas" panose="020B0609020204030204" pitchFamily="49" charset="0"/>
+              </a:rPr>
+              <a:t>i</a:t>
+            </a:r>
+            <a:r>
+              <a:rPr lang="en-US" sz="1100" dirty="0">
+                <a:solidFill>
+                  <a:srgbClr val="000000"/>
+                </a:solidFill>
+                <a:latin typeface="Consolas" panose="020B0609020204030204" pitchFamily="49" charset="0"/>
+              </a:rPr>
+              <a:t>] = sensors[</a:t>
+            </a:r>
+            <a:r>
+              <a:rPr lang="en-US" sz="1100" dirty="0" err="1">
+                <a:solidFill>
+                  <a:srgbClr val="000000"/>
+                </a:solidFill>
+                <a:latin typeface="Consolas" panose="020B0609020204030204" pitchFamily="49" charset="0"/>
+              </a:rPr>
+              <a:t>i</a:t>
+            </a:r>
+            <a:r>
+              <a:rPr lang="en-US" sz="1100" dirty="0">
+                <a:solidFill>
+                  <a:srgbClr val="000000"/>
+                </a:solidFill>
+                <a:latin typeface="Consolas" panose="020B0609020204030204" pitchFamily="49" charset="0"/>
+              </a:rPr>
+              <a:t>].read();</a:t>
+            </a:r>
+          </a:p>
+          <a:p>
+            <a:r>
+              <a:rPr lang="de-DE" sz="1100" dirty="0">
+                <a:solidFill>
+                  <a:srgbClr val="000000"/>
+                </a:solidFill>
+                <a:latin typeface="Consolas" panose="020B0609020204030204" pitchFamily="49" charset="0"/>
+              </a:rPr>
+              <a:t>    }</a:t>
+            </a:r>
+            <a:r>
+              <a:rPr lang="de-DE" sz="800" dirty="0">
+                <a:solidFill>
+                  <a:srgbClr val="000000"/>
+                </a:solidFill>
+                <a:latin typeface="Consolas" panose="020B0609020204030204" pitchFamily="49" charset="0"/>
+              </a:rPr>
+              <a:t> </a:t>
+            </a:r>
+          </a:p>
+          <a:p>
+            <a:endParaRPr lang="de-DE" sz="1100" dirty="0">
+              <a:solidFill>
+                <a:srgbClr val="000000"/>
+              </a:solidFill>
+              <a:latin typeface="Consolas" panose="020B0609020204030204" pitchFamily="49" charset="0"/>
+            </a:endParaRPr>
+          </a:p>
+          <a:p>
+            <a:r>
+              <a:rPr lang="de-DE" sz="1100" dirty="0">
+                <a:solidFill>
+                  <a:srgbClr val="000000"/>
+                </a:solidFill>
+                <a:latin typeface="Consolas" panose="020B0609020204030204" pitchFamily="49" charset="0"/>
+              </a:rPr>
+              <a:t>}</a:t>
+            </a:r>
+            <a:endParaRPr lang="de-DE" sz="1100" dirty="0"/>
+          </a:p>
+        </p:txBody>
+      </p:sp>
+      <p:sp>
+        <p:nvSpPr>
+          <p:cNvPr id="10" name="Textfeld 9">
+            <a:extLst>
+              <a:ext uri="{FF2B5EF4-FFF2-40B4-BE49-F238E27FC236}">
+                <a16:creationId xmlns:a16="http://schemas.microsoft.com/office/drawing/2014/main" id="{CCF95FD6-83AD-4FAB-A250-3E9EC8BEE3A6}"/>
+              </a:ext>
+            </a:extLst>
+          </p:cNvPr>
+          <p:cNvSpPr txBox="1"/>
+          <p:nvPr/>
+        </p:nvSpPr>
+        <p:spPr>
+          <a:xfrm>
+            <a:off x="4174718" y="1915068"/>
+            <a:ext cx="2424959" cy="369332"/>
+          </a:xfrm>
+          <a:prstGeom prst="rect">
+            <a:avLst/>
+          </a:prstGeom>
+          <a:noFill/>
+        </p:spPr>
+        <p:txBody>
+          <a:bodyPr wrap="none" rtlCol="0">
+            <a:spAutoFit/>
+          </a:bodyPr>
+          <a:lstStyle/>
+          <a:p>
+            <a:r>
+              <a:rPr lang="de-DE" dirty="0">
+                <a:solidFill>
+                  <a:schemeClr val="accent1">
+                    <a:lumMod val="75000"/>
+                  </a:schemeClr>
+                </a:solidFill>
+              </a:rPr>
+              <a:t>Parallel </a:t>
+            </a:r>
+            <a:r>
+              <a:rPr lang="de-DE" dirty="0" err="1">
+                <a:solidFill>
+                  <a:schemeClr val="accent1">
+                    <a:lumMod val="75000"/>
+                  </a:schemeClr>
+                </a:solidFill>
+              </a:rPr>
+              <a:t>implementation</a:t>
+            </a:r>
+            <a:endParaRPr lang="de-DE" dirty="0">
+              <a:solidFill>
+                <a:schemeClr val="accent1">
+                  <a:lumMod val="75000"/>
+                </a:schemeClr>
+              </a:solidFill>
+            </a:endParaRPr>
+          </a:p>
+        </p:txBody>
+      </p:sp>
+      <p:sp>
+        <p:nvSpPr>
+          <p:cNvPr id="12" name="Textfeld 11">
+            <a:extLst>
+              <a:ext uri="{FF2B5EF4-FFF2-40B4-BE49-F238E27FC236}">
+                <a16:creationId xmlns:a16="http://schemas.microsoft.com/office/drawing/2014/main" id="{4FBDDCD7-0AAB-4EBA-A30B-29235069E5C3}"/>
+              </a:ext>
+            </a:extLst>
+          </p:cNvPr>
+          <p:cNvSpPr txBox="1"/>
+          <p:nvPr/>
+        </p:nvSpPr>
+        <p:spPr>
+          <a:xfrm>
+            <a:off x="4286026" y="2695556"/>
+            <a:ext cx="5146153" cy="938719"/>
+          </a:xfrm>
+          <a:prstGeom prst="rect">
+            <a:avLst/>
+          </a:prstGeom>
+          <a:solidFill>
+            <a:schemeClr val="accent1">
+              <a:lumMod val="40000"/>
+              <a:lumOff val="60000"/>
+            </a:schemeClr>
+          </a:solidFill>
+        </p:spPr>
+        <p:txBody>
+          <a:bodyPr wrap="square">
+            <a:spAutoFit/>
+          </a:bodyPr>
+          <a:lstStyle/>
+          <a:p>
+            <a:r>
+              <a:rPr lang="en-US" sz="1100" dirty="0">
+                <a:solidFill>
+                  <a:srgbClr val="6F008A"/>
+                </a:solidFill>
+                <a:latin typeface="Consolas" panose="020B0609020204030204" pitchFamily="49" charset="0"/>
+              </a:rPr>
+              <a:t>__global__</a:t>
+            </a:r>
+            <a:r>
+              <a:rPr lang="en-US" sz="1100" dirty="0">
+                <a:solidFill>
+                  <a:srgbClr val="000000"/>
+                </a:solidFill>
+                <a:latin typeface="Consolas" panose="020B0609020204030204" pitchFamily="49" charset="0"/>
+              </a:rPr>
+              <a:t> </a:t>
+            </a:r>
+            <a:r>
+              <a:rPr lang="en-US" sz="1100" dirty="0">
+                <a:solidFill>
+                  <a:srgbClr val="0000FF"/>
+                </a:solidFill>
+                <a:latin typeface="Consolas" panose="020B0609020204030204" pitchFamily="49" charset="0"/>
+              </a:rPr>
+              <a:t>void</a:t>
+            </a:r>
+            <a:r>
+              <a:rPr lang="en-US" sz="1100" dirty="0">
+                <a:solidFill>
+                  <a:srgbClr val="000000"/>
+                </a:solidFill>
+                <a:latin typeface="Consolas" panose="020B0609020204030204" pitchFamily="49" charset="0"/>
+              </a:rPr>
+              <a:t> </a:t>
+            </a:r>
+            <a:r>
+              <a:rPr lang="en-US" sz="1100" dirty="0" err="1">
+                <a:solidFill>
+                  <a:srgbClr val="000000"/>
+                </a:solidFill>
+                <a:latin typeface="Consolas" panose="020B0609020204030204" pitchFamily="49" charset="0"/>
+              </a:rPr>
+              <a:t>readSensorVals</a:t>
+            </a:r>
+            <a:r>
+              <a:rPr lang="en-US" sz="1100" dirty="0">
+                <a:solidFill>
+                  <a:srgbClr val="000000"/>
+                </a:solidFill>
+                <a:latin typeface="Consolas" panose="020B0609020204030204" pitchFamily="49" charset="0"/>
+              </a:rPr>
+              <a:t>(</a:t>
+            </a:r>
+            <a:r>
+              <a:rPr lang="en-US" sz="1100" dirty="0">
+                <a:solidFill>
+                  <a:srgbClr val="0000FF"/>
+                </a:solidFill>
+                <a:latin typeface="Consolas" panose="020B0609020204030204" pitchFamily="49" charset="0"/>
+              </a:rPr>
+              <a:t>double</a:t>
+            </a:r>
+            <a:r>
+              <a:rPr lang="en-US" sz="1100" dirty="0">
+                <a:solidFill>
+                  <a:srgbClr val="000000"/>
+                </a:solidFill>
+                <a:latin typeface="Consolas" panose="020B0609020204030204" pitchFamily="49" charset="0"/>
+              </a:rPr>
+              <a:t> *</a:t>
+            </a:r>
+            <a:r>
+              <a:rPr lang="en-US" sz="1100" dirty="0">
+                <a:solidFill>
+                  <a:srgbClr val="808080"/>
+                </a:solidFill>
+                <a:latin typeface="Consolas" panose="020B0609020204030204" pitchFamily="49" charset="0"/>
+              </a:rPr>
+              <a:t>readings</a:t>
+            </a:r>
+            <a:r>
+              <a:rPr lang="en-US" sz="1100" dirty="0">
+                <a:solidFill>
+                  <a:srgbClr val="000000"/>
+                </a:solidFill>
+                <a:latin typeface="Consolas" panose="020B0609020204030204" pitchFamily="49" charset="0"/>
+              </a:rPr>
+              <a:t>, </a:t>
+            </a:r>
+            <a:r>
+              <a:rPr lang="en-US" sz="1100" dirty="0">
+                <a:solidFill>
+                  <a:srgbClr val="2B91AF"/>
+                </a:solidFill>
+                <a:latin typeface="Consolas" panose="020B0609020204030204" pitchFamily="49" charset="0"/>
+              </a:rPr>
+              <a:t>Sensor</a:t>
+            </a:r>
+            <a:r>
+              <a:rPr lang="en-US" sz="1100" dirty="0">
+                <a:solidFill>
+                  <a:srgbClr val="000000"/>
+                </a:solidFill>
+                <a:latin typeface="Consolas" panose="020B0609020204030204" pitchFamily="49" charset="0"/>
+              </a:rPr>
+              <a:t> *</a:t>
+            </a:r>
+            <a:r>
+              <a:rPr lang="en-US" sz="1100" dirty="0">
+                <a:solidFill>
+                  <a:srgbClr val="808080"/>
+                </a:solidFill>
+                <a:latin typeface="Consolas" panose="020B0609020204030204" pitchFamily="49" charset="0"/>
+              </a:rPr>
+              <a:t>sensors</a:t>
+            </a:r>
+            <a:r>
+              <a:rPr lang="en-US" sz="1100" dirty="0">
+                <a:solidFill>
+                  <a:srgbClr val="000000"/>
+                </a:solidFill>
+                <a:latin typeface="Consolas" panose="020B0609020204030204" pitchFamily="49" charset="0"/>
+              </a:rPr>
+              <a:t>)</a:t>
+            </a:r>
+          </a:p>
+          <a:p>
+            <a:r>
+              <a:rPr lang="de-DE" sz="1100" dirty="0">
+                <a:solidFill>
+                  <a:srgbClr val="000000"/>
+                </a:solidFill>
+                <a:latin typeface="Consolas" panose="020B0609020204030204" pitchFamily="49" charset="0"/>
+              </a:rPr>
+              <a:t>{</a:t>
+            </a:r>
+          </a:p>
+          <a:p>
+            <a:r>
+              <a:rPr lang="de-DE" sz="1100" dirty="0">
+                <a:solidFill>
+                  <a:srgbClr val="000000"/>
+                </a:solidFill>
+                <a:latin typeface="Consolas" panose="020B0609020204030204" pitchFamily="49" charset="0"/>
+              </a:rPr>
+              <a:t>    </a:t>
+            </a:r>
+            <a:r>
+              <a:rPr lang="de-DE" sz="1100" dirty="0" err="1">
+                <a:solidFill>
+                  <a:srgbClr val="0000FF"/>
+                </a:solidFill>
+                <a:latin typeface="Consolas" panose="020B0609020204030204" pitchFamily="49" charset="0"/>
+              </a:rPr>
+              <a:t>int</a:t>
+            </a:r>
+            <a:r>
+              <a:rPr lang="de-DE" sz="1100" dirty="0">
+                <a:solidFill>
+                  <a:srgbClr val="000000"/>
+                </a:solidFill>
+                <a:latin typeface="Consolas" panose="020B0609020204030204" pitchFamily="49" charset="0"/>
+              </a:rPr>
+              <a:t> i = </a:t>
+            </a:r>
+            <a:r>
+              <a:rPr lang="de-DE" sz="1100" dirty="0" err="1">
+                <a:solidFill>
+                  <a:srgbClr val="000000"/>
+                </a:solidFill>
+                <a:latin typeface="Consolas" panose="020B0609020204030204" pitchFamily="49" charset="0"/>
+              </a:rPr>
+              <a:t>threadIdx.x</a:t>
+            </a:r>
+            <a:r>
+              <a:rPr lang="de-DE" sz="1100" dirty="0">
+                <a:solidFill>
+                  <a:srgbClr val="000000"/>
+                </a:solidFill>
+                <a:latin typeface="Consolas" panose="020B0609020204030204" pitchFamily="49" charset="0"/>
+              </a:rPr>
+              <a:t>;</a:t>
+            </a:r>
+          </a:p>
+          <a:p>
+            <a:r>
+              <a:rPr lang="en-US" sz="1100" dirty="0">
+                <a:solidFill>
+                  <a:srgbClr val="000000"/>
+                </a:solidFill>
+                <a:latin typeface="Consolas" panose="020B0609020204030204" pitchFamily="49" charset="0"/>
+              </a:rPr>
+              <a:t>    </a:t>
+            </a:r>
+            <a:r>
+              <a:rPr lang="en-US" sz="1100" dirty="0">
+                <a:solidFill>
+                  <a:srgbClr val="808080"/>
+                </a:solidFill>
+                <a:latin typeface="Consolas" panose="020B0609020204030204" pitchFamily="49" charset="0"/>
+              </a:rPr>
+              <a:t>readings</a:t>
+            </a:r>
+            <a:r>
+              <a:rPr lang="en-US" sz="1100" dirty="0">
+                <a:solidFill>
+                  <a:srgbClr val="000000"/>
+                </a:solidFill>
+                <a:latin typeface="Consolas" panose="020B0609020204030204" pitchFamily="49" charset="0"/>
+              </a:rPr>
+              <a:t>[</a:t>
+            </a:r>
+            <a:r>
+              <a:rPr lang="en-US" sz="1100" dirty="0" err="1">
+                <a:solidFill>
+                  <a:srgbClr val="000000"/>
+                </a:solidFill>
+                <a:latin typeface="Consolas" panose="020B0609020204030204" pitchFamily="49" charset="0"/>
+              </a:rPr>
+              <a:t>i</a:t>
+            </a:r>
+            <a:r>
+              <a:rPr lang="en-US" sz="1100" dirty="0">
+                <a:solidFill>
+                  <a:srgbClr val="000000"/>
+                </a:solidFill>
+                <a:latin typeface="Consolas" panose="020B0609020204030204" pitchFamily="49" charset="0"/>
+              </a:rPr>
+              <a:t>] = </a:t>
+            </a:r>
+            <a:r>
+              <a:rPr lang="en-US" sz="1100" dirty="0">
+                <a:solidFill>
+                  <a:srgbClr val="808080"/>
+                </a:solidFill>
+                <a:latin typeface="Consolas" panose="020B0609020204030204" pitchFamily="49" charset="0"/>
+              </a:rPr>
+              <a:t>sensors</a:t>
+            </a:r>
+            <a:r>
+              <a:rPr lang="en-US" sz="1100" dirty="0">
+                <a:solidFill>
+                  <a:srgbClr val="000000"/>
+                </a:solidFill>
+                <a:latin typeface="Consolas" panose="020B0609020204030204" pitchFamily="49" charset="0"/>
+              </a:rPr>
+              <a:t>[</a:t>
+            </a:r>
+            <a:r>
+              <a:rPr lang="en-US" sz="1100" dirty="0" err="1">
+                <a:solidFill>
+                  <a:srgbClr val="000000"/>
+                </a:solidFill>
+                <a:latin typeface="Consolas" panose="020B0609020204030204" pitchFamily="49" charset="0"/>
+              </a:rPr>
+              <a:t>i</a:t>
+            </a:r>
+            <a:r>
+              <a:rPr lang="en-US" sz="1100" dirty="0">
+                <a:solidFill>
+                  <a:srgbClr val="000000"/>
+                </a:solidFill>
+                <a:latin typeface="Consolas" panose="020B0609020204030204" pitchFamily="49" charset="0"/>
+              </a:rPr>
+              <a:t>].read();</a:t>
+            </a:r>
+          </a:p>
+          <a:p>
+            <a:r>
+              <a:rPr lang="de-DE" sz="1100" dirty="0">
+                <a:solidFill>
+                  <a:srgbClr val="000000"/>
+                </a:solidFill>
+                <a:latin typeface="Consolas" panose="020B0609020204030204" pitchFamily="49" charset="0"/>
+              </a:rPr>
+              <a:t>}</a:t>
+            </a:r>
+            <a:endParaRPr lang="de-DE" sz="1100" dirty="0"/>
+          </a:p>
+        </p:txBody>
+      </p:sp>
+      <p:sp>
+        <p:nvSpPr>
+          <p:cNvPr id="14" name="Textfeld 13">
+            <a:extLst>
+              <a:ext uri="{FF2B5EF4-FFF2-40B4-BE49-F238E27FC236}">
+                <a16:creationId xmlns:a16="http://schemas.microsoft.com/office/drawing/2014/main" id="{43167FC4-4450-44E0-A401-9EA40F913EE9}"/>
+              </a:ext>
+            </a:extLst>
+          </p:cNvPr>
+          <p:cNvSpPr txBox="1"/>
+          <p:nvPr/>
+        </p:nvSpPr>
+        <p:spPr>
+          <a:xfrm>
+            <a:off x="4286023" y="4603770"/>
+            <a:ext cx="5146153" cy="430887"/>
+          </a:xfrm>
+          <a:prstGeom prst="rect">
+            <a:avLst/>
+          </a:prstGeom>
+          <a:solidFill>
+            <a:schemeClr val="accent4">
+              <a:lumMod val="60000"/>
+              <a:lumOff val="40000"/>
+            </a:schemeClr>
+          </a:solidFill>
+        </p:spPr>
+        <p:txBody>
+          <a:bodyPr wrap="square">
+            <a:spAutoFit/>
+          </a:bodyPr>
+          <a:lstStyle/>
+          <a:p>
+            <a:r>
+              <a:rPr lang="en-US" sz="1100" dirty="0">
+                <a:solidFill>
+                  <a:srgbClr val="000000"/>
+                </a:solidFill>
+                <a:latin typeface="Consolas" panose="020B0609020204030204" pitchFamily="49" charset="0"/>
+              </a:rPr>
+              <a:t>    </a:t>
+            </a:r>
+            <a:r>
+              <a:rPr lang="en-US" sz="1100" dirty="0" err="1">
+                <a:solidFill>
+                  <a:srgbClr val="000000"/>
+                </a:solidFill>
+                <a:latin typeface="Consolas" panose="020B0609020204030204" pitchFamily="49" charset="0"/>
+              </a:rPr>
+              <a:t>cudaMalloc</a:t>
+            </a:r>
+            <a:r>
+              <a:rPr lang="en-US" sz="1100" dirty="0">
+                <a:solidFill>
+                  <a:srgbClr val="000000"/>
+                </a:solidFill>
+                <a:latin typeface="Consolas" panose="020B0609020204030204" pitchFamily="49" charset="0"/>
+              </a:rPr>
+              <a:t>(&amp;readings, </a:t>
+            </a:r>
+            <a:r>
+              <a:rPr lang="en-US" sz="1100" dirty="0">
+                <a:solidFill>
+                  <a:srgbClr val="6F008A"/>
+                </a:solidFill>
+                <a:latin typeface="Consolas" panose="020B0609020204030204" pitchFamily="49" charset="0"/>
+              </a:rPr>
+              <a:t>NUM_SENSORS</a:t>
+            </a:r>
+            <a:r>
+              <a:rPr lang="en-US" sz="1100" dirty="0">
+                <a:solidFill>
+                  <a:srgbClr val="000000"/>
+                </a:solidFill>
+                <a:latin typeface="Consolas" panose="020B0609020204030204" pitchFamily="49" charset="0"/>
+              </a:rPr>
+              <a:t> * </a:t>
+            </a:r>
+            <a:r>
+              <a:rPr lang="en-US" sz="1100" dirty="0" err="1">
+                <a:solidFill>
+                  <a:srgbClr val="0000FF"/>
+                </a:solidFill>
+                <a:latin typeface="Consolas" panose="020B0609020204030204" pitchFamily="49" charset="0"/>
+              </a:rPr>
+              <a:t>sizeof</a:t>
+            </a:r>
+            <a:r>
+              <a:rPr lang="en-US" sz="1100" dirty="0">
+                <a:solidFill>
+                  <a:srgbClr val="000000"/>
+                </a:solidFill>
+                <a:latin typeface="Consolas" panose="020B0609020204030204" pitchFamily="49" charset="0"/>
+              </a:rPr>
+              <a:t>(</a:t>
+            </a:r>
+            <a:r>
+              <a:rPr lang="en-US" sz="1100" dirty="0">
+                <a:solidFill>
+                  <a:srgbClr val="0000FF"/>
+                </a:solidFill>
+                <a:latin typeface="Consolas" panose="020B0609020204030204" pitchFamily="49" charset="0"/>
+              </a:rPr>
+              <a:t>double</a:t>
+            </a:r>
+            <a:r>
+              <a:rPr lang="en-US" sz="1100" dirty="0">
+                <a:solidFill>
+                  <a:srgbClr val="000000"/>
+                </a:solidFill>
+                <a:latin typeface="Consolas" panose="020B0609020204030204" pitchFamily="49" charset="0"/>
+              </a:rPr>
+              <a:t>));</a:t>
+            </a:r>
+          </a:p>
+          <a:p>
+            <a:r>
+              <a:rPr lang="en-US" sz="1100" dirty="0">
+                <a:solidFill>
+                  <a:srgbClr val="000000"/>
+                </a:solidFill>
+                <a:latin typeface="Consolas" panose="020B0609020204030204" pitchFamily="49" charset="0"/>
+              </a:rPr>
+              <a:t>    </a:t>
+            </a:r>
+            <a:r>
+              <a:rPr lang="en-US" sz="1100" dirty="0" err="1">
+                <a:solidFill>
+                  <a:srgbClr val="000000"/>
+                </a:solidFill>
+                <a:latin typeface="Consolas" panose="020B0609020204030204" pitchFamily="49" charset="0"/>
+              </a:rPr>
+              <a:t>cudaMalloc</a:t>
+            </a:r>
+            <a:r>
+              <a:rPr lang="en-US" sz="1100" dirty="0">
+                <a:solidFill>
+                  <a:srgbClr val="000000"/>
+                </a:solidFill>
+                <a:latin typeface="Consolas" panose="020B0609020204030204" pitchFamily="49" charset="0"/>
+              </a:rPr>
+              <a:t>(&amp;sensors, </a:t>
+            </a:r>
+            <a:r>
+              <a:rPr lang="en-US" sz="1100" dirty="0">
+                <a:solidFill>
+                  <a:srgbClr val="6F008A"/>
+                </a:solidFill>
+                <a:latin typeface="Consolas" panose="020B0609020204030204" pitchFamily="49" charset="0"/>
+              </a:rPr>
+              <a:t>NUM_SENSORS</a:t>
+            </a:r>
+            <a:r>
+              <a:rPr lang="en-US" sz="1100" dirty="0">
+                <a:solidFill>
+                  <a:srgbClr val="000000"/>
+                </a:solidFill>
+                <a:latin typeface="Consolas" panose="020B0609020204030204" pitchFamily="49" charset="0"/>
+              </a:rPr>
+              <a:t> * </a:t>
+            </a:r>
+            <a:r>
+              <a:rPr lang="en-US" sz="1100" dirty="0" err="1">
+                <a:solidFill>
+                  <a:srgbClr val="0000FF"/>
+                </a:solidFill>
+                <a:latin typeface="Consolas" panose="020B0609020204030204" pitchFamily="49" charset="0"/>
+              </a:rPr>
+              <a:t>sizeof</a:t>
+            </a:r>
+            <a:r>
+              <a:rPr lang="en-US" sz="1100" dirty="0">
+                <a:solidFill>
+                  <a:srgbClr val="000000"/>
+                </a:solidFill>
+                <a:latin typeface="Consolas" panose="020B0609020204030204" pitchFamily="49" charset="0"/>
+              </a:rPr>
+              <a:t>(</a:t>
+            </a:r>
+            <a:r>
+              <a:rPr lang="en-US" sz="1100" dirty="0">
+                <a:solidFill>
+                  <a:srgbClr val="2B91AF"/>
+                </a:solidFill>
+                <a:latin typeface="Consolas" panose="020B0609020204030204" pitchFamily="49" charset="0"/>
+              </a:rPr>
+              <a:t>Sensor</a:t>
+            </a:r>
+            <a:r>
+              <a:rPr lang="en-US" sz="1100" dirty="0">
+                <a:solidFill>
+                  <a:srgbClr val="000000"/>
+                </a:solidFill>
+                <a:latin typeface="Consolas" panose="020B0609020204030204" pitchFamily="49" charset="0"/>
+              </a:rPr>
+              <a:t>));</a:t>
+            </a:r>
+          </a:p>
+        </p:txBody>
+      </p:sp>
+      <p:sp>
+        <p:nvSpPr>
+          <p:cNvPr id="16" name="Textfeld 15">
+            <a:extLst>
+              <a:ext uri="{FF2B5EF4-FFF2-40B4-BE49-F238E27FC236}">
+                <a16:creationId xmlns:a16="http://schemas.microsoft.com/office/drawing/2014/main" id="{FF994C78-2CFC-4C05-8329-45BC8F11EAE4}"/>
+              </a:ext>
+            </a:extLst>
+          </p:cNvPr>
+          <p:cNvSpPr txBox="1"/>
+          <p:nvPr/>
+        </p:nvSpPr>
+        <p:spPr>
+          <a:xfrm>
+            <a:off x="4286023" y="5310527"/>
+            <a:ext cx="5146153" cy="430887"/>
+          </a:xfrm>
+          <a:prstGeom prst="rect">
+            <a:avLst/>
+          </a:prstGeom>
+          <a:solidFill>
+            <a:schemeClr val="accent4">
+              <a:lumMod val="60000"/>
+              <a:lumOff val="40000"/>
+            </a:schemeClr>
+          </a:solidFill>
+        </p:spPr>
+        <p:txBody>
+          <a:bodyPr wrap="square">
+            <a:spAutoFit/>
+          </a:bodyPr>
+          <a:lstStyle/>
+          <a:p>
+            <a:r>
+              <a:rPr lang="de-DE" sz="1100" dirty="0">
+                <a:solidFill>
+                  <a:srgbClr val="000000"/>
+                </a:solidFill>
+                <a:latin typeface="Consolas" panose="020B0609020204030204" pitchFamily="49" charset="0"/>
+              </a:rPr>
+              <a:t>    </a:t>
+            </a:r>
+            <a:r>
+              <a:rPr lang="de-DE" sz="1100" dirty="0" err="1">
+                <a:solidFill>
+                  <a:srgbClr val="000000"/>
+                </a:solidFill>
+                <a:latin typeface="Consolas" panose="020B0609020204030204" pitchFamily="49" charset="0"/>
+              </a:rPr>
+              <a:t>cudaFree</a:t>
+            </a:r>
+            <a:r>
+              <a:rPr lang="de-DE" sz="1100" dirty="0">
+                <a:solidFill>
+                  <a:srgbClr val="000000"/>
+                </a:solidFill>
+                <a:latin typeface="Consolas" panose="020B0609020204030204" pitchFamily="49" charset="0"/>
+              </a:rPr>
+              <a:t>(</a:t>
+            </a:r>
+            <a:r>
+              <a:rPr lang="de-DE" sz="1100" dirty="0" err="1">
+                <a:solidFill>
+                  <a:srgbClr val="000000"/>
+                </a:solidFill>
+                <a:latin typeface="Consolas" panose="020B0609020204030204" pitchFamily="49" charset="0"/>
+              </a:rPr>
+              <a:t>readings</a:t>
+            </a:r>
+            <a:r>
+              <a:rPr lang="de-DE" sz="1100" dirty="0">
+                <a:solidFill>
+                  <a:srgbClr val="000000"/>
+                </a:solidFill>
+                <a:latin typeface="Consolas" panose="020B0609020204030204" pitchFamily="49" charset="0"/>
+              </a:rPr>
+              <a:t>);</a:t>
+            </a:r>
+          </a:p>
+          <a:p>
+            <a:r>
+              <a:rPr lang="de-DE" sz="1100" dirty="0">
+                <a:solidFill>
+                  <a:srgbClr val="000000"/>
+                </a:solidFill>
+                <a:latin typeface="Consolas" panose="020B0609020204030204" pitchFamily="49" charset="0"/>
+              </a:rPr>
+              <a:t>    </a:t>
+            </a:r>
+            <a:r>
+              <a:rPr lang="de-DE" sz="1100" dirty="0" err="1">
+                <a:solidFill>
+                  <a:srgbClr val="000000"/>
+                </a:solidFill>
+                <a:latin typeface="Consolas" panose="020B0609020204030204" pitchFamily="49" charset="0"/>
+              </a:rPr>
+              <a:t>cudaFree</a:t>
+            </a:r>
+            <a:r>
+              <a:rPr lang="de-DE" sz="1100" dirty="0">
+                <a:solidFill>
+                  <a:srgbClr val="000000"/>
+                </a:solidFill>
+                <a:latin typeface="Consolas" panose="020B0609020204030204" pitchFamily="49" charset="0"/>
+              </a:rPr>
+              <a:t>(</a:t>
+            </a:r>
+            <a:r>
+              <a:rPr lang="de-DE" sz="1100" dirty="0" err="1">
+                <a:solidFill>
+                  <a:srgbClr val="000000"/>
+                </a:solidFill>
+                <a:latin typeface="Consolas" panose="020B0609020204030204" pitchFamily="49" charset="0"/>
+              </a:rPr>
+              <a:t>sensors</a:t>
+            </a:r>
+            <a:r>
+              <a:rPr lang="de-DE" sz="1100" dirty="0">
+                <a:solidFill>
+                  <a:srgbClr val="000000"/>
+                </a:solidFill>
+                <a:latin typeface="Consolas" panose="020B0609020204030204" pitchFamily="49" charset="0"/>
+              </a:rPr>
+              <a:t>);</a:t>
+            </a:r>
+          </a:p>
+        </p:txBody>
+      </p:sp>
+      <p:sp>
+        <p:nvSpPr>
+          <p:cNvPr id="18" name="Textfeld 17">
+            <a:extLst>
+              <a:ext uri="{FF2B5EF4-FFF2-40B4-BE49-F238E27FC236}">
+                <a16:creationId xmlns:a16="http://schemas.microsoft.com/office/drawing/2014/main" id="{747E3793-BCB4-4F83-AD29-2CE5DFEECA48}"/>
+              </a:ext>
+            </a:extLst>
+          </p:cNvPr>
+          <p:cNvSpPr txBox="1"/>
+          <p:nvPr/>
+        </p:nvSpPr>
+        <p:spPr>
+          <a:xfrm>
+            <a:off x="4286022" y="5041787"/>
+            <a:ext cx="5146153" cy="261610"/>
+          </a:xfrm>
+          <a:prstGeom prst="rect">
+            <a:avLst/>
+          </a:prstGeom>
+          <a:solidFill>
+            <a:schemeClr val="accent6">
+              <a:lumMod val="60000"/>
+              <a:lumOff val="40000"/>
+            </a:schemeClr>
+          </a:solidFill>
+        </p:spPr>
+        <p:txBody>
+          <a:bodyPr wrap="square">
+            <a:spAutoFit/>
+          </a:bodyPr>
+          <a:lstStyle/>
+          <a:p>
+            <a:r>
+              <a:rPr lang="de-DE" sz="1100" dirty="0" err="1">
+                <a:solidFill>
+                  <a:srgbClr val="000000"/>
+                </a:solidFill>
+                <a:latin typeface="Consolas" panose="020B0609020204030204" pitchFamily="49" charset="0"/>
+              </a:rPr>
+              <a:t>readSensorVals</a:t>
+            </a:r>
+            <a:r>
+              <a:rPr lang="de-DE" sz="1100" dirty="0">
+                <a:solidFill>
+                  <a:srgbClr val="000000"/>
+                </a:solidFill>
+                <a:latin typeface="Consolas" panose="020B0609020204030204" pitchFamily="49" charset="0"/>
+              </a:rPr>
+              <a:t> &lt;&lt;&lt;1, </a:t>
+            </a:r>
+            <a:r>
+              <a:rPr lang="de-DE" sz="1100" dirty="0">
+                <a:solidFill>
+                  <a:srgbClr val="6F008A"/>
+                </a:solidFill>
+                <a:latin typeface="Consolas" panose="020B0609020204030204" pitchFamily="49" charset="0"/>
+              </a:rPr>
+              <a:t>NUM_SENSORS</a:t>
+            </a:r>
+            <a:r>
+              <a:rPr lang="de-DE" sz="1100" dirty="0">
+                <a:solidFill>
+                  <a:srgbClr val="000000"/>
+                </a:solidFill>
+                <a:latin typeface="Consolas" panose="020B0609020204030204" pitchFamily="49" charset="0"/>
+              </a:rPr>
+              <a:t> &gt;&gt;&gt; (&amp;</a:t>
+            </a:r>
+            <a:r>
+              <a:rPr lang="de-DE" sz="1100" dirty="0" err="1">
+                <a:solidFill>
+                  <a:srgbClr val="000000"/>
+                </a:solidFill>
+                <a:latin typeface="Consolas" panose="020B0609020204030204" pitchFamily="49" charset="0"/>
+              </a:rPr>
+              <a:t>readings</a:t>
+            </a:r>
+            <a:r>
+              <a:rPr lang="de-DE" sz="1100" dirty="0">
+                <a:solidFill>
+                  <a:srgbClr val="000000"/>
+                </a:solidFill>
+                <a:latin typeface="Consolas" panose="020B0609020204030204" pitchFamily="49" charset="0"/>
+              </a:rPr>
+              <a:t>,&amp;</a:t>
+            </a:r>
+            <a:r>
+              <a:rPr lang="de-DE" sz="1100" dirty="0" err="1">
+                <a:solidFill>
+                  <a:srgbClr val="000000"/>
+                </a:solidFill>
+                <a:latin typeface="Consolas" panose="020B0609020204030204" pitchFamily="49" charset="0"/>
+              </a:rPr>
+              <a:t>sensors</a:t>
+            </a:r>
+            <a:r>
+              <a:rPr lang="de-DE" sz="1100" dirty="0">
+                <a:solidFill>
+                  <a:srgbClr val="000000"/>
+                </a:solidFill>
+                <a:latin typeface="Consolas" panose="020B0609020204030204" pitchFamily="49" charset="0"/>
+              </a:rPr>
+              <a:t>);</a:t>
+            </a:r>
+          </a:p>
+        </p:txBody>
+      </p:sp>
+      <p:cxnSp>
+        <p:nvCxnSpPr>
+          <p:cNvPr id="20" name="Gerade Verbindung mit Pfeil 19">
+            <a:extLst>
+              <a:ext uri="{FF2B5EF4-FFF2-40B4-BE49-F238E27FC236}">
+                <a16:creationId xmlns:a16="http://schemas.microsoft.com/office/drawing/2014/main" id="{C4D1B77E-F0D9-4C09-AEA5-6A17B4F0980A}"/>
+              </a:ext>
+            </a:extLst>
+          </p:cNvPr>
+          <p:cNvCxnSpPr>
+            <a:cxnSpLocks/>
+            <a:stCxn id="25" idx="4"/>
+            <a:endCxn id="12" idx="3"/>
+          </p:cNvCxnSpPr>
+          <p:nvPr/>
+        </p:nvCxnSpPr>
+        <p:spPr>
+          <a:xfrm flipH="1">
+            <a:off x="9432179" y="2608434"/>
+            <a:ext cx="1302971" cy="556482"/>
+          </a:xfrm>
+          <a:prstGeom prst="straightConnector1">
+            <a:avLst/>
+          </a:prstGeom>
+          <a:ln>
+            <a:tailEnd type="triangle"/>
+          </a:ln>
+        </p:spPr>
+        <p:style>
+          <a:lnRef idx="1">
+            <a:schemeClr val="accent1"/>
+          </a:lnRef>
+          <a:fillRef idx="0">
+            <a:schemeClr val="accent1"/>
+          </a:fillRef>
+          <a:effectRef idx="0">
+            <a:schemeClr val="accent1"/>
+          </a:effectRef>
+          <a:fontRef idx="minor">
+            <a:schemeClr val="tx1"/>
+          </a:fontRef>
+        </p:style>
+      </p:cxnSp>
+      <p:sp>
+        <p:nvSpPr>
+          <p:cNvPr id="25" name="Ellipse 24">
+            <a:extLst>
+              <a:ext uri="{FF2B5EF4-FFF2-40B4-BE49-F238E27FC236}">
+                <a16:creationId xmlns:a16="http://schemas.microsoft.com/office/drawing/2014/main" id="{C0DCD12F-9C91-41BE-AF3D-BFD386B8816F}"/>
+              </a:ext>
+            </a:extLst>
+          </p:cNvPr>
+          <p:cNvSpPr/>
+          <p:nvPr/>
+        </p:nvSpPr>
+        <p:spPr>
+          <a:xfrm>
+            <a:off x="9856260" y="1960365"/>
+            <a:ext cx="1757779" cy="648069"/>
+          </a:xfrm>
+          <a:prstGeom prst="ellipse">
+            <a:avLst/>
+          </a:prstGeom>
+          <a:solidFill>
+            <a:schemeClr val="accent5">
+              <a:lumMod val="60000"/>
+              <a:lumOff val="40000"/>
+            </a:schemeClr>
+          </a:solidFill>
+        </p:spPr>
+        <p:style>
+          <a:lnRef idx="2">
+            <a:schemeClr val="accent1">
+              <a:shade val="50000"/>
+            </a:schemeClr>
+          </a:lnRef>
+          <a:fillRef idx="1">
+            <a:schemeClr val="accent1"/>
+          </a:fillRef>
+          <a:effectRef idx="0">
+            <a:schemeClr val="accent1"/>
+          </a:effectRef>
+          <a:fontRef idx="minor">
+            <a:schemeClr val="lt1"/>
+          </a:fontRef>
+        </p:style>
+        <p:txBody>
+          <a:bodyPr rtlCol="0" anchor="ctr"/>
+          <a:lstStyle/>
+          <a:p>
+            <a:pPr algn="ctr"/>
+            <a:r>
+              <a:rPr lang="de-DE" sz="1200" dirty="0">
+                <a:solidFill>
+                  <a:schemeClr val="accent1">
+                    <a:lumMod val="75000"/>
+                  </a:schemeClr>
+                </a:solidFill>
+              </a:rPr>
+              <a:t>Kernel </a:t>
+            </a:r>
+            <a:r>
+              <a:rPr lang="de-DE" sz="1200" dirty="0" err="1">
+                <a:solidFill>
+                  <a:schemeClr val="accent1">
+                    <a:lumMod val="75000"/>
+                  </a:schemeClr>
+                </a:solidFill>
+              </a:rPr>
+              <a:t>executed</a:t>
+            </a:r>
+            <a:r>
+              <a:rPr lang="de-DE" sz="1200" dirty="0">
+                <a:solidFill>
+                  <a:schemeClr val="accent1">
+                    <a:lumMod val="75000"/>
+                  </a:schemeClr>
+                </a:solidFill>
+              </a:rPr>
+              <a:t> on GPU</a:t>
+            </a:r>
+          </a:p>
+        </p:txBody>
+      </p:sp>
+      <p:sp>
+        <p:nvSpPr>
+          <p:cNvPr id="28" name="Ellipse 27">
+            <a:extLst>
+              <a:ext uri="{FF2B5EF4-FFF2-40B4-BE49-F238E27FC236}">
+                <a16:creationId xmlns:a16="http://schemas.microsoft.com/office/drawing/2014/main" id="{DBE0234B-9FD2-4E3B-81AA-1439CA6CD400}"/>
+              </a:ext>
+            </a:extLst>
+          </p:cNvPr>
+          <p:cNvSpPr/>
+          <p:nvPr/>
+        </p:nvSpPr>
+        <p:spPr>
+          <a:xfrm>
+            <a:off x="1198654" y="4969242"/>
+            <a:ext cx="2021144" cy="596166"/>
+          </a:xfrm>
+          <a:prstGeom prst="ellipse">
+            <a:avLst/>
+          </a:prstGeom>
+          <a:solidFill>
+            <a:schemeClr val="accent4">
+              <a:lumMod val="60000"/>
+              <a:lumOff val="40000"/>
+            </a:schemeClr>
+          </a:solidFill>
+        </p:spPr>
+        <p:style>
+          <a:lnRef idx="2">
+            <a:schemeClr val="accent1">
+              <a:shade val="50000"/>
+            </a:schemeClr>
+          </a:lnRef>
+          <a:fillRef idx="1">
+            <a:schemeClr val="accent1"/>
+          </a:fillRef>
+          <a:effectRef idx="0">
+            <a:schemeClr val="accent1"/>
+          </a:effectRef>
+          <a:fontRef idx="minor">
+            <a:schemeClr val="lt1"/>
+          </a:fontRef>
+        </p:style>
+        <p:txBody>
+          <a:bodyPr rtlCol="0" anchor="ctr"/>
+          <a:lstStyle/>
+          <a:p>
+            <a:pPr algn="ctr"/>
+            <a:r>
+              <a:rPr lang="de-DE" sz="1200" dirty="0" err="1">
+                <a:solidFill>
+                  <a:schemeClr val="accent1">
+                    <a:lumMod val="75000"/>
+                  </a:schemeClr>
+                </a:solidFill>
+              </a:rPr>
+              <a:t>Alloc</a:t>
+            </a:r>
+            <a:r>
+              <a:rPr lang="de-DE" sz="1200" dirty="0">
+                <a:solidFill>
+                  <a:schemeClr val="accent1">
+                    <a:lumMod val="75000"/>
+                  </a:schemeClr>
+                </a:solidFill>
+              </a:rPr>
+              <a:t>/ </a:t>
+            </a:r>
+            <a:r>
+              <a:rPr lang="de-DE" sz="1200" dirty="0" err="1">
+                <a:solidFill>
+                  <a:schemeClr val="accent1">
+                    <a:lumMod val="75000"/>
+                  </a:schemeClr>
+                </a:solidFill>
+              </a:rPr>
+              <a:t>Dealloc</a:t>
+            </a:r>
+            <a:r>
+              <a:rPr lang="de-DE" sz="1200" dirty="0">
+                <a:solidFill>
+                  <a:schemeClr val="accent1">
+                    <a:lumMod val="75000"/>
+                  </a:schemeClr>
+                </a:solidFill>
+              </a:rPr>
+              <a:t> </a:t>
+            </a:r>
+            <a:r>
+              <a:rPr lang="de-DE" sz="1200" dirty="0" err="1">
+                <a:solidFill>
+                  <a:schemeClr val="accent1">
+                    <a:lumMod val="75000"/>
+                  </a:schemeClr>
+                </a:solidFill>
+              </a:rPr>
+              <a:t>of</a:t>
+            </a:r>
+            <a:r>
+              <a:rPr lang="de-DE" sz="1200" dirty="0">
+                <a:solidFill>
+                  <a:schemeClr val="accent1">
+                    <a:lumMod val="75000"/>
+                  </a:schemeClr>
+                </a:solidFill>
+              </a:rPr>
+              <a:t> GPU Memory</a:t>
+            </a:r>
+          </a:p>
+        </p:txBody>
+      </p:sp>
+      <p:cxnSp>
+        <p:nvCxnSpPr>
+          <p:cNvPr id="29" name="Gerade Verbindung mit Pfeil 28">
+            <a:extLst>
+              <a:ext uri="{FF2B5EF4-FFF2-40B4-BE49-F238E27FC236}">
+                <a16:creationId xmlns:a16="http://schemas.microsoft.com/office/drawing/2014/main" id="{18045685-039D-4C7E-82AF-D654BF34E602}"/>
+              </a:ext>
+            </a:extLst>
+          </p:cNvPr>
+          <p:cNvCxnSpPr>
+            <a:cxnSpLocks/>
+            <a:stCxn id="28" idx="7"/>
+            <a:endCxn id="14" idx="1"/>
+          </p:cNvCxnSpPr>
+          <p:nvPr/>
+        </p:nvCxnSpPr>
+        <p:spPr>
+          <a:xfrm flipV="1">
+            <a:off x="2923808" y="4819214"/>
+            <a:ext cx="1362215" cy="237334"/>
+          </a:xfrm>
+          <a:prstGeom prst="straightConnector1">
+            <a:avLst/>
+          </a:prstGeom>
+          <a:ln>
+            <a:tailEnd type="triangle"/>
+          </a:ln>
+        </p:spPr>
+        <p:style>
+          <a:lnRef idx="1">
+            <a:schemeClr val="accent2"/>
+          </a:lnRef>
+          <a:fillRef idx="0">
+            <a:schemeClr val="accent2"/>
+          </a:fillRef>
+          <a:effectRef idx="0">
+            <a:schemeClr val="accent2"/>
+          </a:effectRef>
+          <a:fontRef idx="minor">
+            <a:schemeClr val="tx1"/>
+          </a:fontRef>
+        </p:style>
+      </p:cxnSp>
+      <p:cxnSp>
+        <p:nvCxnSpPr>
+          <p:cNvPr id="32" name="Gerade Verbindung mit Pfeil 31">
+            <a:extLst>
+              <a:ext uri="{FF2B5EF4-FFF2-40B4-BE49-F238E27FC236}">
+                <a16:creationId xmlns:a16="http://schemas.microsoft.com/office/drawing/2014/main" id="{35FA82F8-FD24-4D37-B499-8684543BB98A}"/>
+              </a:ext>
+            </a:extLst>
+          </p:cNvPr>
+          <p:cNvCxnSpPr>
+            <a:cxnSpLocks/>
+            <a:stCxn id="28" idx="5"/>
+            <a:endCxn id="16" idx="1"/>
+          </p:cNvCxnSpPr>
+          <p:nvPr/>
+        </p:nvCxnSpPr>
+        <p:spPr>
+          <a:xfrm>
+            <a:off x="2923808" y="5478102"/>
+            <a:ext cx="1362215" cy="47869"/>
+          </a:xfrm>
+          <a:prstGeom prst="straightConnector1">
+            <a:avLst/>
+          </a:prstGeom>
+          <a:ln>
+            <a:tailEnd type="triangle"/>
+          </a:ln>
+        </p:spPr>
+        <p:style>
+          <a:lnRef idx="1">
+            <a:schemeClr val="accent2"/>
+          </a:lnRef>
+          <a:fillRef idx="0">
+            <a:schemeClr val="accent2"/>
+          </a:fillRef>
+          <a:effectRef idx="0">
+            <a:schemeClr val="accent2"/>
+          </a:effectRef>
+          <a:fontRef idx="minor">
+            <a:schemeClr val="tx1"/>
+          </a:fontRef>
+        </p:style>
+      </p:cxnSp>
+      <p:sp>
+        <p:nvSpPr>
+          <p:cNvPr id="37" name="Ellipse 36">
+            <a:extLst>
+              <a:ext uri="{FF2B5EF4-FFF2-40B4-BE49-F238E27FC236}">
+                <a16:creationId xmlns:a16="http://schemas.microsoft.com/office/drawing/2014/main" id="{7BDB2FA3-75D5-4B63-AF70-73C8A5C3D2D1}"/>
+              </a:ext>
+            </a:extLst>
+          </p:cNvPr>
+          <p:cNvSpPr/>
+          <p:nvPr/>
+        </p:nvSpPr>
+        <p:spPr>
+          <a:xfrm>
+            <a:off x="9314713" y="3779050"/>
+            <a:ext cx="2840871" cy="941033"/>
+          </a:xfrm>
+          <a:prstGeom prst="ellipse">
+            <a:avLst/>
+          </a:prstGeom>
+          <a:solidFill>
+            <a:schemeClr val="accent6">
+              <a:lumMod val="60000"/>
+              <a:lumOff val="40000"/>
+            </a:schemeClr>
+          </a:solidFill>
+        </p:spPr>
+        <p:style>
+          <a:lnRef idx="2">
+            <a:schemeClr val="accent1">
+              <a:shade val="50000"/>
+            </a:schemeClr>
+          </a:lnRef>
+          <a:fillRef idx="1">
+            <a:schemeClr val="accent1"/>
+          </a:fillRef>
+          <a:effectRef idx="0">
+            <a:schemeClr val="accent1"/>
+          </a:effectRef>
+          <a:fontRef idx="minor">
+            <a:schemeClr val="lt1"/>
+          </a:fontRef>
+        </p:style>
+        <p:txBody>
+          <a:bodyPr rtlCol="0" anchor="ctr"/>
+          <a:lstStyle/>
+          <a:p>
+            <a:pPr algn="ctr"/>
+            <a:r>
+              <a:rPr lang="de-DE" sz="1200" dirty="0" err="1">
+                <a:solidFill>
+                  <a:schemeClr val="accent1">
+                    <a:lumMod val="75000"/>
+                  </a:schemeClr>
+                </a:solidFill>
+              </a:rPr>
+              <a:t>Assign</a:t>
+            </a:r>
+            <a:r>
+              <a:rPr lang="de-DE" sz="1200" dirty="0">
+                <a:solidFill>
+                  <a:schemeClr val="accent1">
+                    <a:lumMod val="75000"/>
+                  </a:schemeClr>
+                </a:solidFill>
+              </a:rPr>
+              <a:t> Kernel </a:t>
+            </a:r>
+            <a:r>
+              <a:rPr lang="de-DE" sz="1200" dirty="0" err="1">
+                <a:solidFill>
+                  <a:schemeClr val="accent1">
+                    <a:lumMod val="75000"/>
+                  </a:schemeClr>
+                </a:solidFill>
+              </a:rPr>
+              <a:t>to</a:t>
+            </a:r>
+            <a:r>
+              <a:rPr lang="de-DE" sz="1200" dirty="0">
+                <a:solidFill>
+                  <a:schemeClr val="accent1">
+                    <a:lumMod val="75000"/>
+                  </a:schemeClr>
+                </a:solidFill>
+              </a:rPr>
+              <a:t> GPU:</a:t>
+            </a:r>
+          </a:p>
+          <a:p>
+            <a:pPr algn="ctr"/>
+            <a:r>
+              <a:rPr lang="de-DE" sz="1200" dirty="0">
+                <a:solidFill>
+                  <a:schemeClr val="accent1">
+                    <a:lumMod val="75000"/>
+                  </a:schemeClr>
+                </a:solidFill>
+              </a:rPr>
+              <a:t>1 Block</a:t>
+            </a:r>
+          </a:p>
+          <a:p>
+            <a:pPr algn="ctr"/>
+            <a:r>
+              <a:rPr lang="de-DE" sz="1200" dirty="0">
+                <a:solidFill>
+                  <a:schemeClr val="accent1">
+                    <a:lumMod val="75000"/>
+                  </a:schemeClr>
+                </a:solidFill>
+              </a:rPr>
+              <a:t>50 Threads (NUM_SENSORS)</a:t>
+            </a:r>
+          </a:p>
+        </p:txBody>
+      </p:sp>
+      <p:cxnSp>
+        <p:nvCxnSpPr>
+          <p:cNvPr id="38" name="Gerade Verbindung mit Pfeil 37">
+            <a:extLst>
+              <a:ext uri="{FF2B5EF4-FFF2-40B4-BE49-F238E27FC236}">
+                <a16:creationId xmlns:a16="http://schemas.microsoft.com/office/drawing/2014/main" id="{68925C86-A2BC-40C7-9D59-9AE18833D542}"/>
+              </a:ext>
+            </a:extLst>
+          </p:cNvPr>
+          <p:cNvCxnSpPr>
+            <a:cxnSpLocks/>
+            <a:stCxn id="37" idx="4"/>
+            <a:endCxn id="18" idx="3"/>
+          </p:cNvCxnSpPr>
+          <p:nvPr/>
+        </p:nvCxnSpPr>
+        <p:spPr>
+          <a:xfrm flipH="1">
+            <a:off x="9432175" y="4720083"/>
+            <a:ext cx="1302974" cy="452509"/>
+          </a:xfrm>
+          <a:prstGeom prst="straightConnector1">
+            <a:avLst/>
+          </a:prstGeom>
+          <a:ln>
+            <a:tailEnd type="triangle"/>
+          </a:ln>
+        </p:spPr>
+        <p:style>
+          <a:lnRef idx="1">
+            <a:schemeClr val="accent6"/>
+          </a:lnRef>
+          <a:fillRef idx="0">
+            <a:schemeClr val="accent6"/>
+          </a:fillRef>
+          <a:effectRef idx="0">
+            <a:schemeClr val="accent6"/>
+          </a:effectRef>
+          <a:fontRef idx="minor">
+            <a:schemeClr val="tx1"/>
+          </a:fontRef>
+        </p:style>
+      </p:cxnSp>
+    </p:spTree>
+    <p:extLst>
+      <p:ext uri="{BB962C8B-B14F-4D97-AF65-F5344CB8AC3E}">
+        <p14:creationId xmlns:p14="http://schemas.microsoft.com/office/powerpoint/2010/main" val="4156398573"/>
+      </p:ext>
+    </p:extLst>
+  </p:cSld>
+  <p:clrMapOvr>
+    <a:masterClrMapping/>
+  </p:clrMapOvr>
+  <p:timing>
+    <p:tnLst>
+      <p:par>
+        <p:cTn id="1" dur="indefinite" restart="never" nodeType="tmRoot">
+          <p:childTnLst>
+            <p:seq concurrent="1" nextAc="seek">
+              <p:cTn id="2" dur="indefinite" nodeType="mainSeq">
+                <p:childTnLst>
+                  <p:par>
+                    <p:cTn id="3" fill="hold">
+                      <p:stCondLst>
+                        <p:cond delay="indefinite"/>
+                      </p:stCondLst>
+                      <p:childTnLst>
+                        <p:par>
+                          <p:cTn id="4" fill="hold">
+                            <p:stCondLst>
+                              <p:cond delay="0"/>
+                            </p:stCondLst>
+                            <p:childTnLst>
+                              <p:par>
+                                <p:cTn id="5" presetID="10" presetClass="entr" presetSubtype="0" fill="hold" grpId="0" nodeType="clickEffect">
+                                  <p:stCondLst>
+                                    <p:cond delay="0"/>
+                                  </p:stCondLst>
+                                  <p:childTnLst>
+                                    <p:set>
+                                      <p:cBhvr>
+                                        <p:cTn id="6" dur="1" fill="hold">
+                                          <p:stCondLst>
+                                            <p:cond delay="0"/>
+                                          </p:stCondLst>
+                                        </p:cTn>
+                                        <p:tgtEl>
+                                          <p:spTgt spid="6"/>
+                                        </p:tgtEl>
+                                        <p:attrNameLst>
+                                          <p:attrName>style.visibility</p:attrName>
+                                        </p:attrNameLst>
+                                      </p:cBhvr>
+                                      <p:to>
+                                        <p:strVal val="visible"/>
+                                      </p:to>
+                                    </p:set>
+                                    <p:animEffect transition="in" filter="fade">
+                                      <p:cBhvr>
+                                        <p:cTn id="7" dur="500"/>
+                                        <p:tgtEl>
+                                          <p:spTgt spid="6"/>
+                                        </p:tgtEl>
+                                      </p:cBhvr>
+                                    </p:animEffect>
+                                  </p:childTnLst>
+                                </p:cTn>
+                              </p:par>
+                            </p:childTnLst>
+                          </p:cTn>
+                        </p:par>
+                      </p:childTnLst>
+                    </p:cTn>
+                  </p:par>
+                  <p:par>
+                    <p:cTn id="8" fill="hold">
+                      <p:stCondLst>
+                        <p:cond delay="indefinite"/>
+                      </p:stCondLst>
+                      <p:childTnLst>
+                        <p:par>
+                          <p:cTn id="9" fill="hold">
+                            <p:stCondLst>
+                              <p:cond delay="0"/>
+                            </p:stCondLst>
+                            <p:childTnLst>
+                              <p:par>
+                                <p:cTn id="10" presetID="10" presetClass="entr" presetSubtype="0" fill="hold" grpId="0" nodeType="clickEffect">
+                                  <p:stCondLst>
+                                    <p:cond delay="0"/>
+                                  </p:stCondLst>
+                                  <p:childTnLst>
+                                    <p:set>
+                                      <p:cBhvr>
+                                        <p:cTn id="11" dur="1" fill="hold">
+                                          <p:stCondLst>
+                                            <p:cond delay="0"/>
+                                          </p:stCondLst>
+                                        </p:cTn>
+                                        <p:tgtEl>
+                                          <p:spTgt spid="7"/>
+                                        </p:tgtEl>
+                                        <p:attrNameLst>
+                                          <p:attrName>style.visibility</p:attrName>
+                                        </p:attrNameLst>
+                                      </p:cBhvr>
+                                      <p:to>
+                                        <p:strVal val="visible"/>
+                                      </p:to>
+                                    </p:set>
+                                    <p:animEffect transition="in" filter="fade">
+                                      <p:cBhvr>
+                                        <p:cTn id="12" dur="500"/>
+                                        <p:tgtEl>
+                                          <p:spTgt spid="7"/>
+                                        </p:tgtEl>
+                                      </p:cBhvr>
+                                    </p:animEffect>
+                                  </p:childTnLst>
+                                </p:cTn>
+                              </p:par>
+                            </p:childTnLst>
+                          </p:cTn>
+                        </p:par>
+                      </p:childTnLst>
+                    </p:cTn>
+                  </p:par>
+                  <p:par>
+                    <p:cTn id="13" fill="hold">
+                      <p:stCondLst>
+                        <p:cond delay="indefinite"/>
+                      </p:stCondLst>
+                      <p:childTnLst>
+                        <p:par>
+                          <p:cTn id="14" fill="hold">
+                            <p:stCondLst>
+                              <p:cond delay="0"/>
+                            </p:stCondLst>
+                            <p:childTnLst>
+                              <p:par>
+                                <p:cTn id="15" presetID="10" presetClass="entr" presetSubtype="0" fill="hold" grpId="0" nodeType="clickEffect">
+                                  <p:stCondLst>
+                                    <p:cond delay="0"/>
+                                  </p:stCondLst>
+                                  <p:childTnLst>
+                                    <p:set>
+                                      <p:cBhvr>
+                                        <p:cTn id="16" dur="1" fill="hold">
+                                          <p:stCondLst>
+                                            <p:cond delay="0"/>
+                                          </p:stCondLst>
+                                        </p:cTn>
+                                        <p:tgtEl>
+                                          <p:spTgt spid="8"/>
+                                        </p:tgtEl>
+                                        <p:attrNameLst>
+                                          <p:attrName>style.visibility</p:attrName>
+                                        </p:attrNameLst>
+                                      </p:cBhvr>
+                                      <p:to>
+                                        <p:strVal val="visible"/>
+                                      </p:to>
+                                    </p:set>
+                                    <p:animEffect transition="in" filter="fade">
+                                      <p:cBhvr>
+                                        <p:cTn id="17" dur="500"/>
+                                        <p:tgtEl>
+                                          <p:spTgt spid="8"/>
+                                        </p:tgtEl>
+                                      </p:cBhvr>
+                                    </p:animEffect>
+                                  </p:childTnLst>
+                                </p:cTn>
+                              </p:par>
+                            </p:childTnLst>
+                          </p:cTn>
+                        </p:par>
+                      </p:childTnLst>
+                    </p:cTn>
+                  </p:par>
+                  <p:par>
+                    <p:cTn id="18" fill="hold">
+                      <p:stCondLst>
+                        <p:cond delay="indefinite"/>
+                      </p:stCondLst>
+                      <p:childTnLst>
+                        <p:par>
+                          <p:cTn id="19" fill="hold">
+                            <p:stCondLst>
+                              <p:cond delay="0"/>
+                            </p:stCondLst>
+                            <p:childTnLst>
+                              <p:par>
+                                <p:cTn id="20" presetID="10" presetClass="entr" presetSubtype="0" fill="hold" grpId="0" nodeType="clickEffect">
+                                  <p:stCondLst>
+                                    <p:cond delay="0"/>
+                                  </p:stCondLst>
+                                  <p:childTnLst>
+                                    <p:set>
+                                      <p:cBhvr>
+                                        <p:cTn id="21" dur="1" fill="hold">
+                                          <p:stCondLst>
+                                            <p:cond delay="0"/>
+                                          </p:stCondLst>
+                                        </p:cTn>
+                                        <p:tgtEl>
+                                          <p:spTgt spid="9"/>
+                                        </p:tgtEl>
+                                        <p:attrNameLst>
+                                          <p:attrName>style.visibility</p:attrName>
+                                        </p:attrNameLst>
+                                      </p:cBhvr>
+                                      <p:to>
+                                        <p:strVal val="visible"/>
+                                      </p:to>
+                                    </p:set>
+                                    <p:animEffect transition="in" filter="fade">
+                                      <p:cBhvr>
+                                        <p:cTn id="22" dur="500"/>
+                                        <p:tgtEl>
+                                          <p:spTgt spid="9"/>
+                                        </p:tgtEl>
+                                      </p:cBhvr>
+                                    </p:animEffect>
+                                  </p:childTnLst>
+                                </p:cTn>
+                              </p:par>
+                            </p:childTnLst>
+                          </p:cTn>
+                        </p:par>
+                      </p:childTnLst>
+                    </p:cTn>
+                  </p:par>
+                  <p:par>
+                    <p:cTn id="23" fill="hold">
+                      <p:stCondLst>
+                        <p:cond delay="indefinite"/>
+                      </p:stCondLst>
+                      <p:childTnLst>
+                        <p:par>
+                          <p:cTn id="24" fill="hold">
+                            <p:stCondLst>
+                              <p:cond delay="0"/>
+                            </p:stCondLst>
+                            <p:childTnLst>
+                              <p:par>
+                                <p:cTn id="25" presetID="10" presetClass="entr" presetSubtype="0" fill="hold" grpId="0" nodeType="clickEffect">
+                                  <p:stCondLst>
+                                    <p:cond delay="0"/>
+                                  </p:stCondLst>
+                                  <p:childTnLst>
+                                    <p:set>
+                                      <p:cBhvr>
+                                        <p:cTn id="26" dur="1" fill="hold">
+                                          <p:stCondLst>
+                                            <p:cond delay="0"/>
+                                          </p:stCondLst>
+                                        </p:cTn>
+                                        <p:tgtEl>
+                                          <p:spTgt spid="10"/>
+                                        </p:tgtEl>
+                                        <p:attrNameLst>
+                                          <p:attrName>style.visibility</p:attrName>
+                                        </p:attrNameLst>
+                                      </p:cBhvr>
+                                      <p:to>
+                                        <p:strVal val="visible"/>
+                                      </p:to>
+                                    </p:set>
+                                    <p:animEffect transition="in" filter="fade">
+                                      <p:cBhvr>
+                                        <p:cTn id="27" dur="500"/>
+                                        <p:tgtEl>
+                                          <p:spTgt spid="10"/>
+                                        </p:tgtEl>
+                                      </p:cBhvr>
+                                    </p:animEffect>
+                                  </p:childTnLst>
+                                </p:cTn>
+                              </p:par>
+                            </p:childTnLst>
+                          </p:cTn>
+                        </p:par>
+                      </p:childTnLst>
+                    </p:cTn>
+                  </p:par>
+                  <p:par>
+                    <p:cTn id="28" fill="hold">
+                      <p:stCondLst>
+                        <p:cond delay="indefinite"/>
+                      </p:stCondLst>
+                      <p:childTnLst>
+                        <p:par>
+                          <p:cTn id="29" fill="hold">
+                            <p:stCondLst>
+                              <p:cond delay="0"/>
+                            </p:stCondLst>
+                            <p:childTnLst>
+                              <p:par>
+                                <p:cTn id="30" presetID="10" presetClass="entr" presetSubtype="0" fill="hold" grpId="0" nodeType="clickEffect">
+                                  <p:stCondLst>
+                                    <p:cond delay="0"/>
+                                  </p:stCondLst>
+                                  <p:childTnLst>
+                                    <p:set>
+                                      <p:cBhvr>
+                                        <p:cTn id="31" dur="1" fill="hold">
+                                          <p:stCondLst>
+                                            <p:cond delay="0"/>
+                                          </p:stCondLst>
+                                        </p:cTn>
+                                        <p:tgtEl>
+                                          <p:spTgt spid="5"/>
+                                        </p:tgtEl>
+                                        <p:attrNameLst>
+                                          <p:attrName>style.visibility</p:attrName>
+                                        </p:attrNameLst>
+                                      </p:cBhvr>
+                                      <p:to>
+                                        <p:strVal val="visible"/>
+                                      </p:to>
+                                    </p:set>
+                                    <p:animEffect transition="in" filter="fade">
+                                      <p:cBhvr>
+                                        <p:cTn id="32" dur="500"/>
+                                        <p:tgtEl>
+                                          <p:spTgt spid="5"/>
+                                        </p:tgtEl>
+                                      </p:cBhvr>
+                                    </p:animEffect>
+                                  </p:childTnLst>
+                                </p:cTn>
+                              </p:par>
+                            </p:childTnLst>
+                          </p:cTn>
+                        </p:par>
+                      </p:childTnLst>
+                    </p:cTn>
+                  </p:par>
+                  <p:par>
+                    <p:cTn id="33" fill="hold">
+                      <p:stCondLst>
+                        <p:cond delay="indefinite"/>
+                      </p:stCondLst>
+                      <p:childTnLst>
+                        <p:par>
+                          <p:cTn id="34" fill="hold">
+                            <p:stCondLst>
+                              <p:cond delay="0"/>
+                            </p:stCondLst>
+                            <p:childTnLst>
+                              <p:par>
+                                <p:cTn id="35" presetID="10" presetClass="entr" presetSubtype="0" fill="hold" grpId="0" nodeType="clickEffect">
+                                  <p:stCondLst>
+                                    <p:cond delay="0"/>
+                                  </p:stCondLst>
+                                  <p:childTnLst>
+                                    <p:set>
+                                      <p:cBhvr>
+                                        <p:cTn id="36" dur="1" fill="hold">
+                                          <p:stCondLst>
+                                            <p:cond delay="0"/>
+                                          </p:stCondLst>
+                                        </p:cTn>
+                                        <p:tgtEl>
+                                          <p:spTgt spid="14"/>
+                                        </p:tgtEl>
+                                        <p:attrNameLst>
+                                          <p:attrName>style.visibility</p:attrName>
+                                        </p:attrNameLst>
+                                      </p:cBhvr>
+                                      <p:to>
+                                        <p:strVal val="visible"/>
+                                      </p:to>
+                                    </p:set>
+                                    <p:animEffect transition="in" filter="fade">
+                                      <p:cBhvr>
+                                        <p:cTn id="37" dur="500"/>
+                                        <p:tgtEl>
+                                          <p:spTgt spid="14"/>
+                                        </p:tgtEl>
+                                      </p:cBhvr>
+                                    </p:animEffect>
+                                  </p:childTnLst>
+                                </p:cTn>
+                              </p:par>
+                              <p:par>
+                                <p:cTn id="38" presetID="10" presetClass="entr" presetSubtype="0" fill="hold" grpId="0" nodeType="withEffect">
+                                  <p:stCondLst>
+                                    <p:cond delay="0"/>
+                                  </p:stCondLst>
+                                  <p:childTnLst>
+                                    <p:set>
+                                      <p:cBhvr>
+                                        <p:cTn id="39" dur="1" fill="hold">
+                                          <p:stCondLst>
+                                            <p:cond delay="0"/>
+                                          </p:stCondLst>
+                                        </p:cTn>
+                                        <p:tgtEl>
+                                          <p:spTgt spid="16"/>
+                                        </p:tgtEl>
+                                        <p:attrNameLst>
+                                          <p:attrName>style.visibility</p:attrName>
+                                        </p:attrNameLst>
+                                      </p:cBhvr>
+                                      <p:to>
+                                        <p:strVal val="visible"/>
+                                      </p:to>
+                                    </p:set>
+                                    <p:animEffect transition="in" filter="fade">
+                                      <p:cBhvr>
+                                        <p:cTn id="40" dur="500"/>
+                                        <p:tgtEl>
+                                          <p:spTgt spid="16"/>
+                                        </p:tgtEl>
+                                      </p:cBhvr>
+                                    </p:animEffect>
+                                  </p:childTnLst>
+                                </p:cTn>
+                              </p:par>
+                              <p:par>
+                                <p:cTn id="41" presetID="10" presetClass="entr" presetSubtype="0" fill="hold" nodeType="withEffect">
+                                  <p:stCondLst>
+                                    <p:cond delay="0"/>
+                                  </p:stCondLst>
+                                  <p:childTnLst>
+                                    <p:set>
+                                      <p:cBhvr>
+                                        <p:cTn id="42" dur="1" fill="hold">
+                                          <p:stCondLst>
+                                            <p:cond delay="0"/>
+                                          </p:stCondLst>
+                                        </p:cTn>
+                                        <p:tgtEl>
+                                          <p:spTgt spid="29"/>
+                                        </p:tgtEl>
+                                        <p:attrNameLst>
+                                          <p:attrName>style.visibility</p:attrName>
+                                        </p:attrNameLst>
+                                      </p:cBhvr>
+                                      <p:to>
+                                        <p:strVal val="visible"/>
+                                      </p:to>
+                                    </p:set>
+                                    <p:animEffect transition="in" filter="fade">
+                                      <p:cBhvr>
+                                        <p:cTn id="43" dur="500"/>
+                                        <p:tgtEl>
+                                          <p:spTgt spid="29"/>
+                                        </p:tgtEl>
+                                      </p:cBhvr>
+                                    </p:animEffect>
+                                  </p:childTnLst>
+                                </p:cTn>
+                              </p:par>
+                              <p:par>
+                                <p:cTn id="44" presetID="10" presetClass="entr" presetSubtype="0" fill="hold" nodeType="withEffect">
+                                  <p:stCondLst>
+                                    <p:cond delay="0"/>
+                                  </p:stCondLst>
+                                  <p:childTnLst>
+                                    <p:set>
+                                      <p:cBhvr>
+                                        <p:cTn id="45" dur="1" fill="hold">
+                                          <p:stCondLst>
+                                            <p:cond delay="0"/>
+                                          </p:stCondLst>
+                                        </p:cTn>
+                                        <p:tgtEl>
+                                          <p:spTgt spid="32"/>
+                                        </p:tgtEl>
+                                        <p:attrNameLst>
+                                          <p:attrName>style.visibility</p:attrName>
+                                        </p:attrNameLst>
+                                      </p:cBhvr>
+                                      <p:to>
+                                        <p:strVal val="visible"/>
+                                      </p:to>
+                                    </p:set>
+                                    <p:animEffect transition="in" filter="fade">
+                                      <p:cBhvr>
+                                        <p:cTn id="46" dur="500"/>
+                                        <p:tgtEl>
+                                          <p:spTgt spid="32"/>
+                                        </p:tgtEl>
+                                      </p:cBhvr>
+                                    </p:animEffect>
+                                  </p:childTnLst>
+                                </p:cTn>
+                              </p:par>
+                              <p:par>
+                                <p:cTn id="47" presetID="10" presetClass="entr" presetSubtype="0" fill="hold" grpId="0" nodeType="withEffect">
+                                  <p:stCondLst>
+                                    <p:cond delay="0"/>
+                                  </p:stCondLst>
+                                  <p:childTnLst>
+                                    <p:set>
+                                      <p:cBhvr>
+                                        <p:cTn id="48" dur="1" fill="hold">
+                                          <p:stCondLst>
+                                            <p:cond delay="0"/>
+                                          </p:stCondLst>
+                                        </p:cTn>
+                                        <p:tgtEl>
+                                          <p:spTgt spid="28"/>
+                                        </p:tgtEl>
+                                        <p:attrNameLst>
+                                          <p:attrName>style.visibility</p:attrName>
+                                        </p:attrNameLst>
+                                      </p:cBhvr>
+                                      <p:to>
+                                        <p:strVal val="visible"/>
+                                      </p:to>
+                                    </p:set>
+                                    <p:animEffect transition="in" filter="fade">
+                                      <p:cBhvr>
+                                        <p:cTn id="49" dur="500"/>
+                                        <p:tgtEl>
+                                          <p:spTgt spid="28"/>
+                                        </p:tgtEl>
+                                      </p:cBhvr>
+                                    </p:animEffect>
+                                  </p:childTnLst>
+                                </p:cTn>
+                              </p:par>
+                            </p:childTnLst>
+                          </p:cTn>
+                        </p:par>
+                      </p:childTnLst>
+                    </p:cTn>
+                  </p:par>
+                  <p:par>
+                    <p:cTn id="50" fill="hold">
+                      <p:stCondLst>
+                        <p:cond delay="indefinite"/>
+                      </p:stCondLst>
+                      <p:childTnLst>
+                        <p:par>
+                          <p:cTn id="51" fill="hold">
+                            <p:stCondLst>
+                              <p:cond delay="0"/>
+                            </p:stCondLst>
+                            <p:childTnLst>
+                              <p:par>
+                                <p:cTn id="52" presetID="10" presetClass="entr" presetSubtype="0" fill="hold" grpId="0" nodeType="clickEffect">
+                                  <p:stCondLst>
+                                    <p:cond delay="0"/>
+                                  </p:stCondLst>
+                                  <p:childTnLst>
+                                    <p:set>
+                                      <p:cBhvr>
+                                        <p:cTn id="53" dur="1" fill="hold">
+                                          <p:stCondLst>
+                                            <p:cond delay="0"/>
+                                          </p:stCondLst>
+                                        </p:cTn>
+                                        <p:tgtEl>
+                                          <p:spTgt spid="12"/>
+                                        </p:tgtEl>
+                                        <p:attrNameLst>
+                                          <p:attrName>style.visibility</p:attrName>
+                                        </p:attrNameLst>
+                                      </p:cBhvr>
+                                      <p:to>
+                                        <p:strVal val="visible"/>
+                                      </p:to>
+                                    </p:set>
+                                    <p:animEffect transition="in" filter="fade">
+                                      <p:cBhvr>
+                                        <p:cTn id="54" dur="500"/>
+                                        <p:tgtEl>
+                                          <p:spTgt spid="12"/>
+                                        </p:tgtEl>
+                                      </p:cBhvr>
+                                    </p:animEffect>
+                                  </p:childTnLst>
+                                </p:cTn>
+                              </p:par>
+                              <p:par>
+                                <p:cTn id="55" presetID="10" presetClass="entr" presetSubtype="0" fill="hold" nodeType="withEffect">
+                                  <p:stCondLst>
+                                    <p:cond delay="0"/>
+                                  </p:stCondLst>
+                                  <p:childTnLst>
+                                    <p:set>
+                                      <p:cBhvr>
+                                        <p:cTn id="56" dur="1" fill="hold">
+                                          <p:stCondLst>
+                                            <p:cond delay="0"/>
+                                          </p:stCondLst>
+                                        </p:cTn>
+                                        <p:tgtEl>
+                                          <p:spTgt spid="20"/>
+                                        </p:tgtEl>
+                                        <p:attrNameLst>
+                                          <p:attrName>style.visibility</p:attrName>
+                                        </p:attrNameLst>
+                                      </p:cBhvr>
+                                      <p:to>
+                                        <p:strVal val="visible"/>
+                                      </p:to>
+                                    </p:set>
+                                    <p:animEffect transition="in" filter="fade">
+                                      <p:cBhvr>
+                                        <p:cTn id="57" dur="500"/>
+                                        <p:tgtEl>
+                                          <p:spTgt spid="20"/>
+                                        </p:tgtEl>
+                                      </p:cBhvr>
+                                    </p:animEffect>
+                                  </p:childTnLst>
+                                </p:cTn>
+                              </p:par>
+                              <p:par>
+                                <p:cTn id="58" presetID="10" presetClass="entr" presetSubtype="0" fill="hold" grpId="0" nodeType="withEffect">
+                                  <p:stCondLst>
+                                    <p:cond delay="0"/>
+                                  </p:stCondLst>
+                                  <p:childTnLst>
+                                    <p:set>
+                                      <p:cBhvr>
+                                        <p:cTn id="59" dur="1" fill="hold">
+                                          <p:stCondLst>
+                                            <p:cond delay="0"/>
+                                          </p:stCondLst>
+                                        </p:cTn>
+                                        <p:tgtEl>
+                                          <p:spTgt spid="25"/>
+                                        </p:tgtEl>
+                                        <p:attrNameLst>
+                                          <p:attrName>style.visibility</p:attrName>
+                                        </p:attrNameLst>
+                                      </p:cBhvr>
+                                      <p:to>
+                                        <p:strVal val="visible"/>
+                                      </p:to>
+                                    </p:set>
+                                    <p:animEffect transition="in" filter="fade">
+                                      <p:cBhvr>
+                                        <p:cTn id="60" dur="500"/>
+                                        <p:tgtEl>
+                                          <p:spTgt spid="25"/>
+                                        </p:tgtEl>
+                                      </p:cBhvr>
+                                    </p:animEffect>
+                                  </p:childTnLst>
+                                </p:cTn>
+                              </p:par>
+                            </p:childTnLst>
+                          </p:cTn>
+                        </p:par>
+                      </p:childTnLst>
+                    </p:cTn>
+                  </p:par>
+                  <p:par>
+                    <p:cTn id="61" fill="hold">
+                      <p:stCondLst>
+                        <p:cond delay="indefinite"/>
+                      </p:stCondLst>
+                      <p:childTnLst>
+                        <p:par>
+                          <p:cTn id="62" fill="hold">
+                            <p:stCondLst>
+                              <p:cond delay="0"/>
+                            </p:stCondLst>
+                            <p:childTnLst>
+                              <p:par>
+                                <p:cTn id="63" presetID="10" presetClass="entr" presetSubtype="0" fill="hold" grpId="0" nodeType="clickEffect">
+                                  <p:stCondLst>
+                                    <p:cond delay="0"/>
+                                  </p:stCondLst>
+                                  <p:childTnLst>
+                                    <p:set>
+                                      <p:cBhvr>
+                                        <p:cTn id="64" dur="1" fill="hold">
+                                          <p:stCondLst>
+                                            <p:cond delay="0"/>
+                                          </p:stCondLst>
+                                        </p:cTn>
+                                        <p:tgtEl>
+                                          <p:spTgt spid="18"/>
+                                        </p:tgtEl>
+                                        <p:attrNameLst>
+                                          <p:attrName>style.visibility</p:attrName>
+                                        </p:attrNameLst>
+                                      </p:cBhvr>
+                                      <p:to>
+                                        <p:strVal val="visible"/>
+                                      </p:to>
+                                    </p:set>
+                                    <p:animEffect transition="in" filter="fade">
+                                      <p:cBhvr>
+                                        <p:cTn id="65" dur="500"/>
+                                        <p:tgtEl>
+                                          <p:spTgt spid="18"/>
+                                        </p:tgtEl>
+                                      </p:cBhvr>
+                                    </p:animEffect>
+                                  </p:childTnLst>
+                                </p:cTn>
+                              </p:par>
+                              <p:par>
+                                <p:cTn id="66" presetID="10" presetClass="entr" presetSubtype="0" fill="hold" nodeType="withEffect">
+                                  <p:stCondLst>
+                                    <p:cond delay="0"/>
+                                  </p:stCondLst>
+                                  <p:childTnLst>
+                                    <p:set>
+                                      <p:cBhvr>
+                                        <p:cTn id="67" dur="1" fill="hold">
+                                          <p:stCondLst>
+                                            <p:cond delay="0"/>
+                                          </p:stCondLst>
+                                        </p:cTn>
+                                        <p:tgtEl>
+                                          <p:spTgt spid="38"/>
+                                        </p:tgtEl>
+                                        <p:attrNameLst>
+                                          <p:attrName>style.visibility</p:attrName>
+                                        </p:attrNameLst>
+                                      </p:cBhvr>
+                                      <p:to>
+                                        <p:strVal val="visible"/>
+                                      </p:to>
+                                    </p:set>
+                                    <p:animEffect transition="in" filter="fade">
+                                      <p:cBhvr>
+                                        <p:cTn id="68" dur="500"/>
+                                        <p:tgtEl>
+                                          <p:spTgt spid="38"/>
+                                        </p:tgtEl>
+                                      </p:cBhvr>
+                                    </p:animEffect>
+                                  </p:childTnLst>
+                                </p:cTn>
+                              </p:par>
+                              <p:par>
+                                <p:cTn id="69" presetID="10" presetClass="entr" presetSubtype="0" fill="hold" grpId="0" nodeType="withEffect">
+                                  <p:stCondLst>
+                                    <p:cond delay="0"/>
+                                  </p:stCondLst>
+                                  <p:childTnLst>
+                                    <p:set>
+                                      <p:cBhvr>
+                                        <p:cTn id="70" dur="1" fill="hold">
+                                          <p:stCondLst>
+                                            <p:cond delay="0"/>
+                                          </p:stCondLst>
+                                        </p:cTn>
+                                        <p:tgtEl>
+                                          <p:spTgt spid="37"/>
+                                        </p:tgtEl>
+                                        <p:attrNameLst>
+                                          <p:attrName>style.visibility</p:attrName>
+                                        </p:attrNameLst>
+                                      </p:cBhvr>
+                                      <p:to>
+                                        <p:strVal val="visible"/>
+                                      </p:to>
+                                    </p:set>
+                                    <p:animEffect transition="in" filter="fade">
+                                      <p:cBhvr>
+                                        <p:cTn id="71" dur="500"/>
+                                        <p:tgtEl>
+                                          <p:spTgt spid="37"/>
+                                        </p:tgtEl>
+                                      </p:cBhvr>
+                                    </p:animEffect>
+                                  </p:childTnLst>
+                                </p:cTn>
+                              </p:par>
+                            </p:childTnLst>
+                          </p:cTn>
+                        </p:par>
+                      </p:childTnLst>
+                    </p:cTn>
+                  </p:par>
+                </p:childTnLst>
+              </p:cTn>
+              <p:prevCondLst>
+                <p:cond evt="onPrev" delay="0">
+                  <p:tgtEl>
+                    <p:sldTgt/>
+                  </p:tgtEl>
+                </p:cond>
+              </p:prevCondLst>
+              <p:nextCondLst>
+                <p:cond evt="onNext" delay="0">
+                  <p:tgtEl>
+                    <p:sldTgt/>
+                  </p:tgtEl>
+                </p:cond>
+              </p:nextCondLst>
+            </p:seq>
+          </p:childTnLst>
+        </p:cTn>
+      </p:par>
+    </p:tnLst>
+    <p:bldLst>
+      <p:bldP spid="5" grpId="0"/>
+      <p:bldP spid="6" grpId="0"/>
+      <p:bldP spid="7" grpId="0" animBg="1"/>
+      <p:bldP spid="8" grpId="0"/>
+      <p:bldP spid="9" grpId="0"/>
+      <p:bldP spid="10" grpId="0"/>
+      <p:bldP spid="12" grpId="0" animBg="1"/>
+      <p:bldP spid="14" grpId="0" animBg="1"/>
+      <p:bldP spid="16" grpId="0" animBg="1"/>
+      <p:bldP spid="18" grpId="0" animBg="1"/>
+      <p:bldP spid="25" grpId="0" animBg="1"/>
+      <p:bldP spid="28" grpId="0" animBg="1"/>
+      <p:bldP spid="37" grpId="0" animBg="1"/>
+    </p:bldLst>
+  </p:timing>
+</p:sld>
+</file>
+
 <file path=ppt/theme/theme1.xml><?xml version="1.0" encoding="utf-8"?>
 <a:theme xmlns:a="http://schemas.openxmlformats.org/drawingml/2006/main" name="Office">
   <a:themeElements>

</xml_diff>

<commit_message>
Modification to the GPU Kernel
</commit_message>
<xml_diff>
--- a/Concurrent & Parallel Behavior.pptx
+++ b/Concurrent & Parallel Behavior.pptx
@@ -261,7 +261,7 @@
           <a:p>
             <a:fld id="{6CE6756D-E188-43E4-BCE6-B5CB8CAD8F21}" type="datetimeFigureOut">
               <a:rPr lang="de-DE" smtClean="0"/>
-              <a:t>08.12.2021</a:t>
+              <a:t>09.01.2022</a:t>
             </a:fld>
             <a:endParaRPr lang="de-DE"/>
           </a:p>
@@ -459,7 +459,7 @@
           <a:p>
             <a:fld id="{6CE6756D-E188-43E4-BCE6-B5CB8CAD8F21}" type="datetimeFigureOut">
               <a:rPr lang="de-DE" smtClean="0"/>
-              <a:t>08.12.2021</a:t>
+              <a:t>09.01.2022</a:t>
             </a:fld>
             <a:endParaRPr lang="de-DE"/>
           </a:p>
@@ -667,7 +667,7 @@
           <a:p>
             <a:fld id="{6CE6756D-E188-43E4-BCE6-B5CB8CAD8F21}" type="datetimeFigureOut">
               <a:rPr lang="de-DE" smtClean="0"/>
-              <a:t>08.12.2021</a:t>
+              <a:t>09.01.2022</a:t>
             </a:fld>
             <a:endParaRPr lang="de-DE"/>
           </a:p>
@@ -865,7 +865,7 @@
           <a:p>
             <a:fld id="{6CE6756D-E188-43E4-BCE6-B5CB8CAD8F21}" type="datetimeFigureOut">
               <a:rPr lang="de-DE" smtClean="0"/>
-              <a:t>08.12.2021</a:t>
+              <a:t>09.01.2022</a:t>
             </a:fld>
             <a:endParaRPr lang="de-DE"/>
           </a:p>
@@ -1140,7 +1140,7 @@
           <a:p>
             <a:fld id="{6CE6756D-E188-43E4-BCE6-B5CB8CAD8F21}" type="datetimeFigureOut">
               <a:rPr lang="de-DE" smtClean="0"/>
-              <a:t>08.12.2021</a:t>
+              <a:t>09.01.2022</a:t>
             </a:fld>
             <a:endParaRPr lang="de-DE"/>
           </a:p>
@@ -1405,7 +1405,7 @@
           <a:p>
             <a:fld id="{6CE6756D-E188-43E4-BCE6-B5CB8CAD8F21}" type="datetimeFigureOut">
               <a:rPr lang="de-DE" smtClean="0"/>
-              <a:t>08.12.2021</a:t>
+              <a:t>09.01.2022</a:t>
             </a:fld>
             <a:endParaRPr lang="de-DE"/>
           </a:p>
@@ -1817,7 +1817,7 @@
           <a:p>
             <a:fld id="{6CE6756D-E188-43E4-BCE6-B5CB8CAD8F21}" type="datetimeFigureOut">
               <a:rPr lang="de-DE" smtClean="0"/>
-              <a:t>08.12.2021</a:t>
+              <a:t>09.01.2022</a:t>
             </a:fld>
             <a:endParaRPr lang="de-DE"/>
           </a:p>
@@ -1958,7 +1958,7 @@
           <a:p>
             <a:fld id="{6CE6756D-E188-43E4-BCE6-B5CB8CAD8F21}" type="datetimeFigureOut">
               <a:rPr lang="de-DE" smtClean="0"/>
-              <a:t>08.12.2021</a:t>
+              <a:t>09.01.2022</a:t>
             </a:fld>
             <a:endParaRPr lang="de-DE"/>
           </a:p>
@@ -2071,7 +2071,7 @@
           <a:p>
             <a:fld id="{6CE6756D-E188-43E4-BCE6-B5CB8CAD8F21}" type="datetimeFigureOut">
               <a:rPr lang="de-DE" smtClean="0"/>
-              <a:t>08.12.2021</a:t>
+              <a:t>09.01.2022</a:t>
             </a:fld>
             <a:endParaRPr lang="de-DE"/>
           </a:p>
@@ -2382,7 +2382,7 @@
           <a:p>
             <a:fld id="{6CE6756D-E188-43E4-BCE6-B5CB8CAD8F21}" type="datetimeFigureOut">
               <a:rPr lang="de-DE" smtClean="0"/>
-              <a:t>08.12.2021</a:t>
+              <a:t>09.01.2022</a:t>
             </a:fld>
             <a:endParaRPr lang="de-DE"/>
           </a:p>
@@ -2670,7 +2670,7 @@
           <a:p>
             <a:fld id="{6CE6756D-E188-43E4-BCE6-B5CB8CAD8F21}" type="datetimeFigureOut">
               <a:rPr lang="de-DE" smtClean="0"/>
-              <a:t>08.12.2021</a:t>
+              <a:t>09.01.2022</a:t>
             </a:fld>
             <a:endParaRPr lang="de-DE"/>
           </a:p>
@@ -2911,7 +2911,7 @@
           <a:p>
             <a:fld id="{6CE6756D-E188-43E4-BCE6-B5CB8CAD8F21}" type="datetimeFigureOut">
               <a:rPr lang="de-DE" smtClean="0"/>
-              <a:t>08.12.2021</a:t>
+              <a:t>09.01.2022</a:t>
             </a:fld>
             <a:endParaRPr lang="de-DE"/>
           </a:p>
@@ -11993,7 +11993,7 @@
         <p:spPr>
           <a:xfrm>
             <a:off x="4286026" y="2695556"/>
-            <a:ext cx="5146153" cy="938719"/>
+            <a:ext cx="5683597" cy="1107996"/>
           </a:xfrm>
           <a:prstGeom prst="rect">
             <a:avLst/>
@@ -12066,6 +12066,39 @@
               <a:t>(</a:t>
             </a:r>
             <a:r>
+              <a:rPr lang="de-DE" sz="1100" dirty="0" err="1">
+                <a:solidFill>
+                  <a:srgbClr val="0000FF"/>
+                </a:solidFill>
+                <a:latin typeface="Consolas" panose="020B0609020204030204" pitchFamily="49" charset="0"/>
+              </a:rPr>
+              <a:t>int</a:t>
+            </a:r>
+            <a:r>
+              <a:rPr lang="de-DE" sz="1100" dirty="0">
+                <a:solidFill>
+                  <a:srgbClr val="0000FF"/>
+                </a:solidFill>
+                <a:latin typeface="Consolas" panose="020B0609020204030204" pitchFamily="49" charset="0"/>
+              </a:rPr>
+              <a:t> </a:t>
+            </a:r>
+            <a:r>
+              <a:rPr lang="de-DE" sz="1100" dirty="0">
+                <a:latin typeface="Consolas" panose="020B0609020204030204" pitchFamily="49" charset="0"/>
+              </a:rPr>
+              <a:t>n</a:t>
+            </a:r>
+            <a:r>
+              <a:rPr lang="de-DE" sz="1100" dirty="0">
+                <a:solidFill>
+                  <a:srgbClr val="0000FF"/>
+                </a:solidFill>
+                <a:latin typeface="Consolas" panose="020B0609020204030204" pitchFamily="49" charset="0"/>
+              </a:rPr>
+              <a:t>, </a:t>
+            </a:r>
+            <a:r>
               <a:rPr lang="en-US" sz="1100" dirty="0">
                 <a:solidFill>
                   <a:srgbClr val="0000FF"/>
@@ -12194,6 +12227,29 @@
                 <a:latin typeface="Consolas" panose="020B0609020204030204" pitchFamily="49" charset="0"/>
               </a:rPr>
               <a:t>;</a:t>
+            </a:r>
+          </a:p>
+          <a:p>
+            <a:r>
+              <a:rPr lang="de-DE" sz="1100" dirty="0">
+                <a:solidFill>
+                  <a:srgbClr val="0000FF"/>
+                </a:solidFill>
+                <a:latin typeface="Consolas" panose="020B0609020204030204" pitchFamily="49" charset="0"/>
+              </a:rPr>
+              <a:t>    </a:t>
+            </a:r>
+            <a:r>
+              <a:rPr lang="de-DE" sz="1100" dirty="0" err="1">
+                <a:latin typeface="Consolas" panose="020B0609020204030204" pitchFamily="49" charset="0"/>
+              </a:rPr>
+              <a:t>if</a:t>
+            </a:r>
+            <a:r>
+              <a:rPr lang="de-DE" sz="1100" dirty="0">
+                <a:latin typeface="Consolas" panose="020B0609020204030204" pitchFamily="49" charset="0"/>
+              </a:rPr>
+              <a:t>(i &lt; n)</a:t>
             </a:r>
           </a:p>
           <a:p>
@@ -12308,7 +12364,7 @@
         <p:spPr>
           <a:xfrm>
             <a:off x="4286023" y="4603770"/>
-            <a:ext cx="5146153" cy="430887"/>
+            <a:ext cx="5683600" cy="430887"/>
           </a:xfrm>
           <a:prstGeom prst="rect">
             <a:avLst/>
@@ -12508,7 +12564,7 @@
         <p:spPr>
           <a:xfrm>
             <a:off x="4286023" y="5310527"/>
-            <a:ext cx="5146153" cy="430887"/>
+            <a:ext cx="5683600" cy="430887"/>
           </a:xfrm>
           <a:prstGeom prst="rect">
             <a:avLst/>
@@ -12636,7 +12692,7 @@
         <p:spPr>
           <a:xfrm>
             <a:off x="4286022" y="5041787"/>
-            <a:ext cx="5146153" cy="261610"/>
+            <a:ext cx="5683601" cy="261610"/>
           </a:xfrm>
           <a:prstGeom prst="rect">
             <a:avLst/>
@@ -12688,7 +12744,25 @@
                 </a:solidFill>
                 <a:latin typeface="Consolas" panose="020B0609020204030204" pitchFamily="49" charset="0"/>
               </a:rPr>
-              <a:t> &gt;&gt;&gt; (&amp;</a:t>
+              <a:t> &gt;&gt;&gt; (</a:t>
+            </a:r>
+            <a:r>
+              <a:rPr lang="de-DE" sz="1100" dirty="0">
+                <a:solidFill>
+                  <a:srgbClr val="6F008A"/>
+                </a:solidFill>
+                <a:latin typeface="Consolas" panose="020B0609020204030204" pitchFamily="49" charset="0"/>
+              </a:rPr>
+              <a:t>NUM_SENSORS, </a:t>
+            </a:r>
+            <a:r>
+              <a:rPr lang="de-DE" sz="1100" dirty="0">
+                <a:solidFill>
+                  <a:srgbClr val="000000"/>
+                </a:solidFill>
+                <a:latin typeface="Consolas" panose="020B0609020204030204" pitchFamily="49" charset="0"/>
+              </a:rPr>
+              <a:t>&amp;</a:t>
             </a:r>
             <a:r>
               <a:rPr lang="de-DE" sz="1100" dirty="0" err="1">
@@ -12747,8 +12821,8 @@
         </p:nvCxnSpPr>
         <p:spPr>
           <a:xfrm flipH="1">
-            <a:off x="9432179" y="2608434"/>
-            <a:ext cx="1302971" cy="556482"/>
+            <a:off x="9969623" y="2608434"/>
+            <a:ext cx="765527" cy="641120"/>
           </a:xfrm>
           <a:prstGeom prst="straightConnector1">
             <a:avLst/>
@@ -13185,8 +13259,8 @@
         </p:nvCxnSpPr>
         <p:spPr>
           <a:xfrm flipH="1">
-            <a:off x="9432175" y="4720083"/>
-            <a:ext cx="1302974" cy="452509"/>
+            <a:off x="9969623" y="4720083"/>
+            <a:ext cx="765526" cy="452509"/>
           </a:xfrm>
           <a:prstGeom prst="straightConnector1">
             <a:avLst/>

</xml_diff>